<commit_message>
Add content to presenation
- QR code format url
- TTN Mapper Drawing
</commit_message>
<xml_diff>
--- a/2018-10-22 Maker Meet (Graham & TTN Mapper)/Presentation - TTN Mapper.pptx
+++ b/2018-10-22 Maker Meet (Graham & TTN Mapper)/Presentation - TTN Mapper.pptx
@@ -5,20 +5,20 @@
     <p:sldMasterId id="2147483726" r:id="rId1"/>
   </p:sldMasterIdLst>
   <p:sldIdLst>
-    <p:sldId id="271" r:id="rId2"/>
-    <p:sldId id="258" r:id="rId3"/>
-    <p:sldId id="259" r:id="rId4"/>
-    <p:sldId id="260" r:id="rId5"/>
-    <p:sldId id="261" r:id="rId6"/>
-    <p:sldId id="262" r:id="rId7"/>
-    <p:sldId id="263" r:id="rId8"/>
-    <p:sldId id="264" r:id="rId9"/>
-    <p:sldId id="265" r:id="rId10"/>
-    <p:sldId id="266" r:id="rId11"/>
-    <p:sldId id="267" r:id="rId12"/>
-    <p:sldId id="268" r:id="rId13"/>
-    <p:sldId id="269" r:id="rId14"/>
-    <p:sldId id="270" r:id="rId15"/>
+    <p:sldId id="258" r:id="rId2"/>
+    <p:sldId id="259" r:id="rId3"/>
+    <p:sldId id="260" r:id="rId4"/>
+    <p:sldId id="261" r:id="rId5"/>
+    <p:sldId id="262" r:id="rId6"/>
+    <p:sldId id="263" r:id="rId7"/>
+    <p:sldId id="264" r:id="rId8"/>
+    <p:sldId id="265" r:id="rId9"/>
+    <p:sldId id="266" r:id="rId10"/>
+    <p:sldId id="267" r:id="rId11"/>
+    <p:sldId id="268" r:id="rId12"/>
+    <p:sldId id="269" r:id="rId13"/>
+    <p:sldId id="270" r:id="rId14"/>
+    <p:sldId id="271" r:id="rId15"/>
     <p:sldId id="256" r:id="rId16"/>
     <p:sldId id="257" r:id="rId17"/>
   </p:sldIdLst>
@@ -149,7 +149,7 @@
           <p:cNvPr id="2" name="Title 1">
             <a:extLst>
               <a:ext uri="{FF2B5EF4-FFF2-40B4-BE49-F238E27FC236}">
-                <a16:creationId xmlns:a16="http://schemas.microsoft.com/office/drawing/2014/main" id="{4E504EBE-70CD-47F3-BA7F-2CC0F03D39C2}"/>
+                <a16:creationId xmlns:a16="http://schemas.microsoft.com/office/drawing/2014/main" xmlns="" id="{4E504EBE-70CD-47F3-BA7F-2CC0F03D39C2}"/>
               </a:ext>
             </a:extLst>
           </p:cNvPr>
@@ -187,7 +187,7 @@
           <p:cNvPr id="3" name="Subtitle 2">
             <a:extLst>
               <a:ext uri="{FF2B5EF4-FFF2-40B4-BE49-F238E27FC236}">
-                <a16:creationId xmlns:a16="http://schemas.microsoft.com/office/drawing/2014/main" id="{109363D4-3D1F-423F-B3FE-8DE08F388A91}"/>
+                <a16:creationId xmlns:a16="http://schemas.microsoft.com/office/drawing/2014/main" xmlns="" id="{109363D4-3D1F-423F-B3FE-8DE08F388A91}"/>
               </a:ext>
             </a:extLst>
           </p:cNvPr>
@@ -258,7 +258,7 @@
           <p:cNvPr id="4" name="Date Placeholder 3">
             <a:extLst>
               <a:ext uri="{FF2B5EF4-FFF2-40B4-BE49-F238E27FC236}">
-                <a16:creationId xmlns:a16="http://schemas.microsoft.com/office/drawing/2014/main" id="{D4A0D907-742C-4158-8BDC-39813E94D326}"/>
+                <a16:creationId xmlns:a16="http://schemas.microsoft.com/office/drawing/2014/main" xmlns="" id="{D4A0D907-742C-4158-8BDC-39813E94D326}"/>
               </a:ext>
             </a:extLst>
           </p:cNvPr>
@@ -287,7 +287,7 @@
           <p:cNvPr id="5" name="Footer Placeholder 4">
             <a:extLst>
               <a:ext uri="{FF2B5EF4-FFF2-40B4-BE49-F238E27FC236}">
-                <a16:creationId xmlns:a16="http://schemas.microsoft.com/office/drawing/2014/main" id="{435BDF7F-7B0E-484A-AF7E-7FAB45E9323A}"/>
+                <a16:creationId xmlns:a16="http://schemas.microsoft.com/office/drawing/2014/main" xmlns="" id="{435BDF7F-7B0E-484A-AF7E-7FAB45E9323A}"/>
               </a:ext>
             </a:extLst>
           </p:cNvPr>
@@ -312,7 +312,7 @@
           <p:cNvPr id="6" name="Slide Number Placeholder 5">
             <a:extLst>
               <a:ext uri="{FF2B5EF4-FFF2-40B4-BE49-F238E27FC236}">
-                <a16:creationId xmlns:a16="http://schemas.microsoft.com/office/drawing/2014/main" id="{08723F0C-97D5-4796-AD6B-C14AF3CBEB84}"/>
+                <a16:creationId xmlns:a16="http://schemas.microsoft.com/office/drawing/2014/main" xmlns="" id="{08723F0C-97D5-4796-AD6B-C14AF3CBEB84}"/>
               </a:ext>
             </a:extLst>
           </p:cNvPr>
@@ -371,7 +371,7 @@
           <p:cNvPr id="2" name="Title 1">
             <a:extLst>
               <a:ext uri="{FF2B5EF4-FFF2-40B4-BE49-F238E27FC236}">
-                <a16:creationId xmlns:a16="http://schemas.microsoft.com/office/drawing/2014/main" id="{9DA618E1-886B-45E8-B10E-33321CA2377F}"/>
+                <a16:creationId xmlns:a16="http://schemas.microsoft.com/office/drawing/2014/main" xmlns="" id="{9DA618E1-886B-45E8-B10E-33321CA2377F}"/>
               </a:ext>
             </a:extLst>
           </p:cNvPr>
@@ -400,7 +400,7 @@
           <p:cNvPr id="3" name="Vertical Text Placeholder 2">
             <a:extLst>
               <a:ext uri="{FF2B5EF4-FFF2-40B4-BE49-F238E27FC236}">
-                <a16:creationId xmlns:a16="http://schemas.microsoft.com/office/drawing/2014/main" id="{F5520A49-E73D-4568-A446-34C37966B825}"/>
+                <a16:creationId xmlns:a16="http://schemas.microsoft.com/office/drawing/2014/main" xmlns="" id="{F5520A49-E73D-4568-A446-34C37966B825}"/>
               </a:ext>
             </a:extLst>
           </p:cNvPr>
@@ -458,7 +458,7 @@
           <p:cNvPr id="4" name="Date Placeholder 3">
             <a:extLst>
               <a:ext uri="{FF2B5EF4-FFF2-40B4-BE49-F238E27FC236}">
-                <a16:creationId xmlns:a16="http://schemas.microsoft.com/office/drawing/2014/main" id="{8AD2C46C-3C14-402E-9E19-353AB35423E6}"/>
+                <a16:creationId xmlns:a16="http://schemas.microsoft.com/office/drawing/2014/main" xmlns="" id="{8AD2C46C-3C14-402E-9E19-353AB35423E6}"/>
               </a:ext>
             </a:extLst>
           </p:cNvPr>
@@ -487,7 +487,7 @@
           <p:cNvPr id="5" name="Footer Placeholder 4">
             <a:extLst>
               <a:ext uri="{FF2B5EF4-FFF2-40B4-BE49-F238E27FC236}">
-                <a16:creationId xmlns:a16="http://schemas.microsoft.com/office/drawing/2014/main" id="{B3784619-DDC1-4C45-AA18-32CFDDD86368}"/>
+                <a16:creationId xmlns:a16="http://schemas.microsoft.com/office/drawing/2014/main" xmlns="" id="{B3784619-DDC1-4C45-AA18-32CFDDD86368}"/>
               </a:ext>
             </a:extLst>
           </p:cNvPr>
@@ -512,7 +512,7 @@
           <p:cNvPr id="6" name="Slide Number Placeholder 5">
             <a:extLst>
               <a:ext uri="{FF2B5EF4-FFF2-40B4-BE49-F238E27FC236}">
-                <a16:creationId xmlns:a16="http://schemas.microsoft.com/office/drawing/2014/main" id="{B36AD6D7-B640-474F-BF87-609BC7978FD4}"/>
+                <a16:creationId xmlns:a16="http://schemas.microsoft.com/office/drawing/2014/main" xmlns="" id="{B36AD6D7-B640-474F-BF87-609BC7978FD4}"/>
               </a:ext>
             </a:extLst>
           </p:cNvPr>
@@ -571,7 +571,7 @@
           <p:cNvPr id="2" name="Vertical Title 1">
             <a:extLst>
               <a:ext uri="{FF2B5EF4-FFF2-40B4-BE49-F238E27FC236}">
-                <a16:creationId xmlns:a16="http://schemas.microsoft.com/office/drawing/2014/main" id="{AF1CA764-4099-4EF3-9378-A725EE4D11BB}"/>
+                <a16:creationId xmlns:a16="http://schemas.microsoft.com/office/drawing/2014/main" xmlns="" id="{AF1CA764-4099-4EF3-9378-A725EE4D11BB}"/>
               </a:ext>
             </a:extLst>
           </p:cNvPr>
@@ -605,7 +605,7 @@
           <p:cNvPr id="3" name="Vertical Text Placeholder 2">
             <a:extLst>
               <a:ext uri="{FF2B5EF4-FFF2-40B4-BE49-F238E27FC236}">
-                <a16:creationId xmlns:a16="http://schemas.microsoft.com/office/drawing/2014/main" id="{D2535AF6-631F-442B-A9E9-10BC96C53BD0}"/>
+                <a16:creationId xmlns:a16="http://schemas.microsoft.com/office/drawing/2014/main" xmlns="" id="{D2535AF6-631F-442B-A9E9-10BC96C53BD0}"/>
               </a:ext>
             </a:extLst>
           </p:cNvPr>
@@ -668,7 +668,7 @@
           <p:cNvPr id="4" name="Date Placeholder 3">
             <a:extLst>
               <a:ext uri="{FF2B5EF4-FFF2-40B4-BE49-F238E27FC236}">
-                <a16:creationId xmlns:a16="http://schemas.microsoft.com/office/drawing/2014/main" id="{B798DEF0-C1C6-4B99-9383-9F4C45A6AF49}"/>
+                <a16:creationId xmlns:a16="http://schemas.microsoft.com/office/drawing/2014/main" xmlns="" id="{B798DEF0-C1C6-4B99-9383-9F4C45A6AF49}"/>
               </a:ext>
             </a:extLst>
           </p:cNvPr>
@@ -697,7 +697,7 @@
           <p:cNvPr id="5" name="Footer Placeholder 4">
             <a:extLst>
               <a:ext uri="{FF2B5EF4-FFF2-40B4-BE49-F238E27FC236}">
-                <a16:creationId xmlns:a16="http://schemas.microsoft.com/office/drawing/2014/main" id="{0ABE772A-54A6-45B1-ABC5-109C624873DC}"/>
+                <a16:creationId xmlns:a16="http://schemas.microsoft.com/office/drawing/2014/main" xmlns="" id="{0ABE772A-54A6-45B1-ABC5-109C624873DC}"/>
               </a:ext>
             </a:extLst>
           </p:cNvPr>
@@ -722,7 +722,7 @@
           <p:cNvPr id="6" name="Slide Number Placeholder 5">
             <a:extLst>
               <a:ext uri="{FF2B5EF4-FFF2-40B4-BE49-F238E27FC236}">
-                <a16:creationId xmlns:a16="http://schemas.microsoft.com/office/drawing/2014/main" id="{A90A103B-F2B7-4C04-A5C4-1DCB6FB7BFD2}"/>
+                <a16:creationId xmlns:a16="http://schemas.microsoft.com/office/drawing/2014/main" xmlns="" id="{A90A103B-F2B7-4C04-A5C4-1DCB6FB7BFD2}"/>
               </a:ext>
             </a:extLst>
           </p:cNvPr>
@@ -781,7 +781,7 @@
           <p:cNvPr id="2" name="Title 1">
             <a:extLst>
               <a:ext uri="{FF2B5EF4-FFF2-40B4-BE49-F238E27FC236}">
-                <a16:creationId xmlns:a16="http://schemas.microsoft.com/office/drawing/2014/main" id="{929E6565-DB6E-4554-B3E1-5FA44EC078D3}"/>
+                <a16:creationId xmlns:a16="http://schemas.microsoft.com/office/drawing/2014/main" xmlns="" id="{929E6565-DB6E-4554-B3E1-5FA44EC078D3}"/>
               </a:ext>
             </a:extLst>
           </p:cNvPr>
@@ -810,7 +810,7 @@
           <p:cNvPr id="3" name="Content Placeholder 2">
             <a:extLst>
               <a:ext uri="{FF2B5EF4-FFF2-40B4-BE49-F238E27FC236}">
-                <a16:creationId xmlns:a16="http://schemas.microsoft.com/office/drawing/2014/main" id="{07372D2B-EC58-4297-8505-F01AB7790FA4}"/>
+                <a16:creationId xmlns:a16="http://schemas.microsoft.com/office/drawing/2014/main" xmlns="" id="{07372D2B-EC58-4297-8505-F01AB7790FA4}"/>
               </a:ext>
             </a:extLst>
           </p:cNvPr>
@@ -868,7 +868,7 @@
           <p:cNvPr id="4" name="Date Placeholder 3">
             <a:extLst>
               <a:ext uri="{FF2B5EF4-FFF2-40B4-BE49-F238E27FC236}">
-                <a16:creationId xmlns:a16="http://schemas.microsoft.com/office/drawing/2014/main" id="{E4208CBD-E2E6-4DDD-AE6C-F080B051E0E6}"/>
+                <a16:creationId xmlns:a16="http://schemas.microsoft.com/office/drawing/2014/main" xmlns="" id="{E4208CBD-E2E6-4DDD-AE6C-F080B051E0E6}"/>
               </a:ext>
             </a:extLst>
           </p:cNvPr>
@@ -897,7 +897,7 @@
           <p:cNvPr id="5" name="Footer Placeholder 4">
             <a:extLst>
               <a:ext uri="{FF2B5EF4-FFF2-40B4-BE49-F238E27FC236}">
-                <a16:creationId xmlns:a16="http://schemas.microsoft.com/office/drawing/2014/main" id="{4913CA25-99C2-457A-AA6F-3C668725F02A}"/>
+                <a16:creationId xmlns:a16="http://schemas.microsoft.com/office/drawing/2014/main" xmlns="" id="{4913CA25-99C2-457A-AA6F-3C668725F02A}"/>
               </a:ext>
             </a:extLst>
           </p:cNvPr>
@@ -922,7 +922,7 @@
           <p:cNvPr id="6" name="Slide Number Placeholder 5">
             <a:extLst>
               <a:ext uri="{FF2B5EF4-FFF2-40B4-BE49-F238E27FC236}">
-                <a16:creationId xmlns:a16="http://schemas.microsoft.com/office/drawing/2014/main" id="{5CD81140-31E6-45BD-AF2C-4C0B0E1FB621}"/>
+                <a16:creationId xmlns:a16="http://schemas.microsoft.com/office/drawing/2014/main" xmlns="" id="{5CD81140-31E6-45BD-AF2C-4C0B0E1FB621}"/>
               </a:ext>
             </a:extLst>
           </p:cNvPr>
@@ -981,7 +981,7 @@
           <p:cNvPr id="2" name="Title 1">
             <a:extLst>
               <a:ext uri="{FF2B5EF4-FFF2-40B4-BE49-F238E27FC236}">
-                <a16:creationId xmlns:a16="http://schemas.microsoft.com/office/drawing/2014/main" id="{C1505D14-C1B0-4BB6-89A8-B8E0959ABFD5}"/>
+                <a16:creationId xmlns:a16="http://schemas.microsoft.com/office/drawing/2014/main" xmlns="" id="{C1505D14-C1B0-4BB6-89A8-B8E0959ABFD5}"/>
               </a:ext>
             </a:extLst>
           </p:cNvPr>
@@ -1019,7 +1019,7 @@
           <p:cNvPr id="3" name="Text Placeholder 2">
             <a:extLst>
               <a:ext uri="{FF2B5EF4-FFF2-40B4-BE49-F238E27FC236}">
-                <a16:creationId xmlns:a16="http://schemas.microsoft.com/office/drawing/2014/main" id="{CFBEC51D-ED8D-45EE-9498-996BE1CFE9BE}"/>
+                <a16:creationId xmlns:a16="http://schemas.microsoft.com/office/drawing/2014/main" xmlns="" id="{CFBEC51D-ED8D-45EE-9498-996BE1CFE9BE}"/>
               </a:ext>
             </a:extLst>
           </p:cNvPr>
@@ -1144,7 +1144,7 @@
           <p:cNvPr id="4" name="Date Placeholder 3">
             <a:extLst>
               <a:ext uri="{FF2B5EF4-FFF2-40B4-BE49-F238E27FC236}">
-                <a16:creationId xmlns:a16="http://schemas.microsoft.com/office/drawing/2014/main" id="{96B8FDF7-50DC-47DF-9365-C4D08B2FF238}"/>
+                <a16:creationId xmlns:a16="http://schemas.microsoft.com/office/drawing/2014/main" xmlns="" id="{96B8FDF7-50DC-47DF-9365-C4D08B2FF238}"/>
               </a:ext>
             </a:extLst>
           </p:cNvPr>
@@ -1173,7 +1173,7 @@
           <p:cNvPr id="5" name="Footer Placeholder 4">
             <a:extLst>
               <a:ext uri="{FF2B5EF4-FFF2-40B4-BE49-F238E27FC236}">
-                <a16:creationId xmlns:a16="http://schemas.microsoft.com/office/drawing/2014/main" id="{0706E521-15EB-4EE0-83C8-6D7B5267754C}"/>
+                <a16:creationId xmlns:a16="http://schemas.microsoft.com/office/drawing/2014/main" xmlns="" id="{0706E521-15EB-4EE0-83C8-6D7B5267754C}"/>
               </a:ext>
             </a:extLst>
           </p:cNvPr>
@@ -1198,7 +1198,7 @@
           <p:cNvPr id="6" name="Slide Number Placeholder 5">
             <a:extLst>
               <a:ext uri="{FF2B5EF4-FFF2-40B4-BE49-F238E27FC236}">
-                <a16:creationId xmlns:a16="http://schemas.microsoft.com/office/drawing/2014/main" id="{7670681C-75E2-4A40-92B4-1DFFCBD25870}"/>
+                <a16:creationId xmlns:a16="http://schemas.microsoft.com/office/drawing/2014/main" xmlns="" id="{7670681C-75E2-4A40-92B4-1DFFCBD25870}"/>
               </a:ext>
             </a:extLst>
           </p:cNvPr>
@@ -1257,7 +1257,7 @@
           <p:cNvPr id="2" name="Title 1">
             <a:extLst>
               <a:ext uri="{FF2B5EF4-FFF2-40B4-BE49-F238E27FC236}">
-                <a16:creationId xmlns:a16="http://schemas.microsoft.com/office/drawing/2014/main" id="{53E127F6-972F-4291-B91C-B7DE11084F7B}"/>
+                <a16:creationId xmlns:a16="http://schemas.microsoft.com/office/drawing/2014/main" xmlns="" id="{53E127F6-972F-4291-B91C-B7DE11084F7B}"/>
               </a:ext>
             </a:extLst>
           </p:cNvPr>
@@ -1286,7 +1286,7 @@
           <p:cNvPr id="3" name="Content Placeholder 2">
             <a:extLst>
               <a:ext uri="{FF2B5EF4-FFF2-40B4-BE49-F238E27FC236}">
-                <a16:creationId xmlns:a16="http://schemas.microsoft.com/office/drawing/2014/main" id="{DBE1DB71-8FA3-4A6D-9811-2642D3D31499}"/>
+                <a16:creationId xmlns:a16="http://schemas.microsoft.com/office/drawing/2014/main" xmlns="" id="{DBE1DB71-8FA3-4A6D-9811-2642D3D31499}"/>
               </a:ext>
             </a:extLst>
           </p:cNvPr>
@@ -1349,7 +1349,7 @@
           <p:cNvPr id="4" name="Content Placeholder 3">
             <a:extLst>
               <a:ext uri="{FF2B5EF4-FFF2-40B4-BE49-F238E27FC236}">
-                <a16:creationId xmlns:a16="http://schemas.microsoft.com/office/drawing/2014/main" id="{52505627-EC1D-4131-A418-0B83318E79F5}"/>
+                <a16:creationId xmlns:a16="http://schemas.microsoft.com/office/drawing/2014/main" xmlns="" id="{52505627-EC1D-4131-A418-0B83318E79F5}"/>
               </a:ext>
             </a:extLst>
           </p:cNvPr>
@@ -1412,7 +1412,7 @@
           <p:cNvPr id="5" name="Date Placeholder 4">
             <a:extLst>
               <a:ext uri="{FF2B5EF4-FFF2-40B4-BE49-F238E27FC236}">
-                <a16:creationId xmlns:a16="http://schemas.microsoft.com/office/drawing/2014/main" id="{E2065FE7-75DB-4D73-B366-89019001A3B5}"/>
+                <a16:creationId xmlns:a16="http://schemas.microsoft.com/office/drawing/2014/main" xmlns="" id="{E2065FE7-75DB-4D73-B366-89019001A3B5}"/>
               </a:ext>
             </a:extLst>
           </p:cNvPr>
@@ -1441,7 +1441,7 @@
           <p:cNvPr id="6" name="Footer Placeholder 5">
             <a:extLst>
               <a:ext uri="{FF2B5EF4-FFF2-40B4-BE49-F238E27FC236}">
-                <a16:creationId xmlns:a16="http://schemas.microsoft.com/office/drawing/2014/main" id="{B8E34A3E-5544-4034-AD83-E473A450DC13}"/>
+                <a16:creationId xmlns:a16="http://schemas.microsoft.com/office/drawing/2014/main" xmlns="" id="{B8E34A3E-5544-4034-AD83-E473A450DC13}"/>
               </a:ext>
             </a:extLst>
           </p:cNvPr>
@@ -1466,7 +1466,7 @@
           <p:cNvPr id="7" name="Slide Number Placeholder 6">
             <a:extLst>
               <a:ext uri="{FF2B5EF4-FFF2-40B4-BE49-F238E27FC236}">
-                <a16:creationId xmlns:a16="http://schemas.microsoft.com/office/drawing/2014/main" id="{826B265A-6D0E-479C-854C-A05E2E1203B9}"/>
+                <a16:creationId xmlns:a16="http://schemas.microsoft.com/office/drawing/2014/main" xmlns="" id="{826B265A-6D0E-479C-854C-A05E2E1203B9}"/>
               </a:ext>
             </a:extLst>
           </p:cNvPr>
@@ -1525,7 +1525,7 @@
           <p:cNvPr id="2" name="Title 1">
             <a:extLst>
               <a:ext uri="{FF2B5EF4-FFF2-40B4-BE49-F238E27FC236}">
-                <a16:creationId xmlns:a16="http://schemas.microsoft.com/office/drawing/2014/main" id="{AF3C01A5-7233-45A8-8A9F-25450B445762}"/>
+                <a16:creationId xmlns:a16="http://schemas.microsoft.com/office/drawing/2014/main" xmlns="" id="{AF3C01A5-7233-45A8-8A9F-25450B445762}"/>
               </a:ext>
             </a:extLst>
           </p:cNvPr>
@@ -1559,7 +1559,7 @@
           <p:cNvPr id="3" name="Text Placeholder 2">
             <a:extLst>
               <a:ext uri="{FF2B5EF4-FFF2-40B4-BE49-F238E27FC236}">
-                <a16:creationId xmlns:a16="http://schemas.microsoft.com/office/drawing/2014/main" id="{BCEB74C7-6837-4DEF-8268-2BF6EDA41925}"/>
+                <a16:creationId xmlns:a16="http://schemas.microsoft.com/office/drawing/2014/main" xmlns="" id="{BCEB74C7-6837-4DEF-8268-2BF6EDA41925}"/>
               </a:ext>
             </a:extLst>
           </p:cNvPr>
@@ -1630,7 +1630,7 @@
           <p:cNvPr id="4" name="Content Placeholder 3">
             <a:extLst>
               <a:ext uri="{FF2B5EF4-FFF2-40B4-BE49-F238E27FC236}">
-                <a16:creationId xmlns:a16="http://schemas.microsoft.com/office/drawing/2014/main" id="{33903316-F99A-4274-BAAF-E69B2DED8509}"/>
+                <a16:creationId xmlns:a16="http://schemas.microsoft.com/office/drawing/2014/main" xmlns="" id="{33903316-F99A-4274-BAAF-E69B2DED8509}"/>
               </a:ext>
             </a:extLst>
           </p:cNvPr>
@@ -1693,7 +1693,7 @@
           <p:cNvPr id="5" name="Text Placeholder 4">
             <a:extLst>
               <a:ext uri="{FF2B5EF4-FFF2-40B4-BE49-F238E27FC236}">
-                <a16:creationId xmlns:a16="http://schemas.microsoft.com/office/drawing/2014/main" id="{E10E912A-B58A-4A04-B2DA-5738596CB1DB}"/>
+                <a16:creationId xmlns:a16="http://schemas.microsoft.com/office/drawing/2014/main" xmlns="" id="{E10E912A-B58A-4A04-B2DA-5738596CB1DB}"/>
               </a:ext>
             </a:extLst>
           </p:cNvPr>
@@ -1764,7 +1764,7 @@
           <p:cNvPr id="6" name="Content Placeholder 5">
             <a:extLst>
               <a:ext uri="{FF2B5EF4-FFF2-40B4-BE49-F238E27FC236}">
-                <a16:creationId xmlns:a16="http://schemas.microsoft.com/office/drawing/2014/main" id="{EF38BA6C-4E44-4F20-BE49-E672C6B89073}"/>
+                <a16:creationId xmlns:a16="http://schemas.microsoft.com/office/drawing/2014/main" xmlns="" id="{EF38BA6C-4E44-4F20-BE49-E672C6B89073}"/>
               </a:ext>
             </a:extLst>
           </p:cNvPr>
@@ -1827,7 +1827,7 @@
           <p:cNvPr id="7" name="Date Placeholder 6">
             <a:extLst>
               <a:ext uri="{FF2B5EF4-FFF2-40B4-BE49-F238E27FC236}">
-                <a16:creationId xmlns:a16="http://schemas.microsoft.com/office/drawing/2014/main" id="{88993EC3-85E5-46F3-906D-9923687A9F21}"/>
+                <a16:creationId xmlns:a16="http://schemas.microsoft.com/office/drawing/2014/main" xmlns="" id="{88993EC3-85E5-46F3-906D-9923687A9F21}"/>
               </a:ext>
             </a:extLst>
           </p:cNvPr>
@@ -1856,7 +1856,7 @@
           <p:cNvPr id="8" name="Footer Placeholder 7">
             <a:extLst>
               <a:ext uri="{FF2B5EF4-FFF2-40B4-BE49-F238E27FC236}">
-                <a16:creationId xmlns:a16="http://schemas.microsoft.com/office/drawing/2014/main" id="{7F4E6CF6-E40D-4AF5-9374-031507D892E2}"/>
+                <a16:creationId xmlns:a16="http://schemas.microsoft.com/office/drawing/2014/main" xmlns="" id="{7F4E6CF6-E40D-4AF5-9374-031507D892E2}"/>
               </a:ext>
             </a:extLst>
           </p:cNvPr>
@@ -1881,7 +1881,7 @@
           <p:cNvPr id="9" name="Slide Number Placeholder 8">
             <a:extLst>
               <a:ext uri="{FF2B5EF4-FFF2-40B4-BE49-F238E27FC236}">
-                <a16:creationId xmlns:a16="http://schemas.microsoft.com/office/drawing/2014/main" id="{8528AA85-7618-432D-8B2F-C26AECAD69CE}"/>
+                <a16:creationId xmlns:a16="http://schemas.microsoft.com/office/drawing/2014/main" xmlns="" id="{8528AA85-7618-432D-8B2F-C26AECAD69CE}"/>
               </a:ext>
             </a:extLst>
           </p:cNvPr>
@@ -1940,7 +1940,7 @@
           <p:cNvPr id="2" name="Title 1">
             <a:extLst>
               <a:ext uri="{FF2B5EF4-FFF2-40B4-BE49-F238E27FC236}">
-                <a16:creationId xmlns:a16="http://schemas.microsoft.com/office/drawing/2014/main" id="{052B5DD0-6AE5-47BB-81D1-70C1FB0B36BC}"/>
+                <a16:creationId xmlns:a16="http://schemas.microsoft.com/office/drawing/2014/main" xmlns="" id="{052B5DD0-6AE5-47BB-81D1-70C1FB0B36BC}"/>
               </a:ext>
             </a:extLst>
           </p:cNvPr>
@@ -1969,7 +1969,7 @@
           <p:cNvPr id="3" name="Date Placeholder 2">
             <a:extLst>
               <a:ext uri="{FF2B5EF4-FFF2-40B4-BE49-F238E27FC236}">
-                <a16:creationId xmlns:a16="http://schemas.microsoft.com/office/drawing/2014/main" id="{1FD3F1A0-E2B5-47B1-89D0-BB54F39095BB}"/>
+                <a16:creationId xmlns:a16="http://schemas.microsoft.com/office/drawing/2014/main" xmlns="" id="{1FD3F1A0-E2B5-47B1-89D0-BB54F39095BB}"/>
               </a:ext>
             </a:extLst>
           </p:cNvPr>
@@ -1998,7 +1998,7 @@
           <p:cNvPr id="4" name="Footer Placeholder 3">
             <a:extLst>
               <a:ext uri="{FF2B5EF4-FFF2-40B4-BE49-F238E27FC236}">
-                <a16:creationId xmlns:a16="http://schemas.microsoft.com/office/drawing/2014/main" id="{CB8A0252-5C6E-498E-908E-DFD4CD3729E1}"/>
+                <a16:creationId xmlns:a16="http://schemas.microsoft.com/office/drawing/2014/main" xmlns="" id="{CB8A0252-5C6E-498E-908E-DFD4CD3729E1}"/>
               </a:ext>
             </a:extLst>
           </p:cNvPr>
@@ -2023,7 +2023,7 @@
           <p:cNvPr id="5" name="Slide Number Placeholder 4">
             <a:extLst>
               <a:ext uri="{FF2B5EF4-FFF2-40B4-BE49-F238E27FC236}">
-                <a16:creationId xmlns:a16="http://schemas.microsoft.com/office/drawing/2014/main" id="{7967F6B1-314D-4167-85C4-2B2D968DC447}"/>
+                <a16:creationId xmlns:a16="http://schemas.microsoft.com/office/drawing/2014/main" xmlns="" id="{7967F6B1-314D-4167-85C4-2B2D968DC447}"/>
               </a:ext>
             </a:extLst>
           </p:cNvPr>
@@ -2082,7 +2082,7 @@
           <p:cNvPr id="2" name="Date Placeholder 1">
             <a:extLst>
               <a:ext uri="{FF2B5EF4-FFF2-40B4-BE49-F238E27FC236}">
-                <a16:creationId xmlns:a16="http://schemas.microsoft.com/office/drawing/2014/main" id="{B72F9EF2-4D36-4E01-8BED-EDBA4EACAF38}"/>
+                <a16:creationId xmlns:a16="http://schemas.microsoft.com/office/drawing/2014/main" xmlns="" id="{B72F9EF2-4D36-4E01-8BED-EDBA4EACAF38}"/>
               </a:ext>
             </a:extLst>
           </p:cNvPr>
@@ -2111,7 +2111,7 @@
           <p:cNvPr id="3" name="Footer Placeholder 2">
             <a:extLst>
               <a:ext uri="{FF2B5EF4-FFF2-40B4-BE49-F238E27FC236}">
-                <a16:creationId xmlns:a16="http://schemas.microsoft.com/office/drawing/2014/main" id="{15DEAE97-1662-4354-8669-4B98F8552DF5}"/>
+                <a16:creationId xmlns:a16="http://schemas.microsoft.com/office/drawing/2014/main" xmlns="" id="{15DEAE97-1662-4354-8669-4B98F8552DF5}"/>
               </a:ext>
             </a:extLst>
           </p:cNvPr>
@@ -2136,7 +2136,7 @@
           <p:cNvPr id="4" name="Slide Number Placeholder 3">
             <a:extLst>
               <a:ext uri="{FF2B5EF4-FFF2-40B4-BE49-F238E27FC236}">
-                <a16:creationId xmlns:a16="http://schemas.microsoft.com/office/drawing/2014/main" id="{A0ABE573-68D9-4E1A-B81C-D2960331E203}"/>
+                <a16:creationId xmlns:a16="http://schemas.microsoft.com/office/drawing/2014/main" xmlns="" id="{A0ABE573-68D9-4E1A-B81C-D2960331E203}"/>
               </a:ext>
             </a:extLst>
           </p:cNvPr>
@@ -2195,7 +2195,7 @@
           <p:cNvPr id="2" name="Title 1">
             <a:extLst>
               <a:ext uri="{FF2B5EF4-FFF2-40B4-BE49-F238E27FC236}">
-                <a16:creationId xmlns:a16="http://schemas.microsoft.com/office/drawing/2014/main" id="{93CCA779-3084-4F43-9A3E-2DC84E588218}"/>
+                <a16:creationId xmlns:a16="http://schemas.microsoft.com/office/drawing/2014/main" xmlns="" id="{93CCA779-3084-4F43-9A3E-2DC84E588218}"/>
               </a:ext>
             </a:extLst>
           </p:cNvPr>
@@ -2233,7 +2233,7 @@
           <p:cNvPr id="3" name="Content Placeholder 2">
             <a:extLst>
               <a:ext uri="{FF2B5EF4-FFF2-40B4-BE49-F238E27FC236}">
-                <a16:creationId xmlns:a16="http://schemas.microsoft.com/office/drawing/2014/main" id="{706E5FAE-0303-45B7-93CD-74D612AD98D8}"/>
+                <a16:creationId xmlns:a16="http://schemas.microsoft.com/office/drawing/2014/main" xmlns="" id="{706E5FAE-0303-45B7-93CD-74D612AD98D8}"/>
               </a:ext>
             </a:extLst>
           </p:cNvPr>
@@ -2324,7 +2324,7 @@
           <p:cNvPr id="4" name="Text Placeholder 3">
             <a:extLst>
               <a:ext uri="{FF2B5EF4-FFF2-40B4-BE49-F238E27FC236}">
-                <a16:creationId xmlns:a16="http://schemas.microsoft.com/office/drawing/2014/main" id="{5453FFAC-491B-4FA6-A0E6-75BC907A9150}"/>
+                <a16:creationId xmlns:a16="http://schemas.microsoft.com/office/drawing/2014/main" xmlns="" id="{5453FFAC-491B-4FA6-A0E6-75BC907A9150}"/>
               </a:ext>
             </a:extLst>
           </p:cNvPr>
@@ -2395,7 +2395,7 @@
           <p:cNvPr id="5" name="Date Placeholder 4">
             <a:extLst>
               <a:ext uri="{FF2B5EF4-FFF2-40B4-BE49-F238E27FC236}">
-                <a16:creationId xmlns:a16="http://schemas.microsoft.com/office/drawing/2014/main" id="{2168A85C-51B8-4CD7-981B-66EC0EE01CC6}"/>
+                <a16:creationId xmlns:a16="http://schemas.microsoft.com/office/drawing/2014/main" xmlns="" id="{2168A85C-51B8-4CD7-981B-66EC0EE01CC6}"/>
               </a:ext>
             </a:extLst>
           </p:cNvPr>
@@ -2424,7 +2424,7 @@
           <p:cNvPr id="6" name="Footer Placeholder 5">
             <a:extLst>
               <a:ext uri="{FF2B5EF4-FFF2-40B4-BE49-F238E27FC236}">
-                <a16:creationId xmlns:a16="http://schemas.microsoft.com/office/drawing/2014/main" id="{CBBAC3B3-5FE1-4D3B-9F06-719F56C23BB4}"/>
+                <a16:creationId xmlns:a16="http://schemas.microsoft.com/office/drawing/2014/main" xmlns="" id="{CBBAC3B3-5FE1-4D3B-9F06-719F56C23BB4}"/>
               </a:ext>
             </a:extLst>
           </p:cNvPr>
@@ -2449,7 +2449,7 @@
           <p:cNvPr id="7" name="Slide Number Placeholder 6">
             <a:extLst>
               <a:ext uri="{FF2B5EF4-FFF2-40B4-BE49-F238E27FC236}">
-                <a16:creationId xmlns:a16="http://schemas.microsoft.com/office/drawing/2014/main" id="{EC4B09D8-7D17-4CAE-A0A8-6C6D1C6CEE69}"/>
+                <a16:creationId xmlns:a16="http://schemas.microsoft.com/office/drawing/2014/main" xmlns="" id="{EC4B09D8-7D17-4CAE-A0A8-6C6D1C6CEE69}"/>
               </a:ext>
             </a:extLst>
           </p:cNvPr>
@@ -2508,7 +2508,7 @@
           <p:cNvPr id="2" name="Title 1">
             <a:extLst>
               <a:ext uri="{FF2B5EF4-FFF2-40B4-BE49-F238E27FC236}">
-                <a16:creationId xmlns:a16="http://schemas.microsoft.com/office/drawing/2014/main" id="{F221B9BE-81DA-4599-91EC-DF5C24E4817B}"/>
+                <a16:creationId xmlns:a16="http://schemas.microsoft.com/office/drawing/2014/main" xmlns="" id="{F221B9BE-81DA-4599-91EC-DF5C24E4817B}"/>
               </a:ext>
             </a:extLst>
           </p:cNvPr>
@@ -2546,7 +2546,7 @@
           <p:cNvPr id="3" name="Picture Placeholder 2">
             <a:extLst>
               <a:ext uri="{FF2B5EF4-FFF2-40B4-BE49-F238E27FC236}">
-                <a16:creationId xmlns:a16="http://schemas.microsoft.com/office/drawing/2014/main" id="{6B62689F-F10C-404F-8324-5080C5E81785}"/>
+                <a16:creationId xmlns:a16="http://schemas.microsoft.com/office/drawing/2014/main" xmlns="" id="{6B62689F-F10C-404F-8324-5080C5E81785}"/>
               </a:ext>
             </a:extLst>
           </p:cNvPr>
@@ -2613,7 +2613,7 @@
           <p:cNvPr id="4" name="Text Placeholder 3">
             <a:extLst>
               <a:ext uri="{FF2B5EF4-FFF2-40B4-BE49-F238E27FC236}">
-                <a16:creationId xmlns:a16="http://schemas.microsoft.com/office/drawing/2014/main" id="{0279B34E-8A7A-456D-B678-3FAA608CC799}"/>
+                <a16:creationId xmlns:a16="http://schemas.microsoft.com/office/drawing/2014/main" xmlns="" id="{0279B34E-8A7A-456D-B678-3FAA608CC799}"/>
               </a:ext>
             </a:extLst>
           </p:cNvPr>
@@ -2684,7 +2684,7 @@
           <p:cNvPr id="5" name="Date Placeholder 4">
             <a:extLst>
               <a:ext uri="{FF2B5EF4-FFF2-40B4-BE49-F238E27FC236}">
-                <a16:creationId xmlns:a16="http://schemas.microsoft.com/office/drawing/2014/main" id="{3EEF209A-0751-4E8C-9492-0DC7B5B91928}"/>
+                <a16:creationId xmlns:a16="http://schemas.microsoft.com/office/drawing/2014/main" xmlns="" id="{3EEF209A-0751-4E8C-9492-0DC7B5B91928}"/>
               </a:ext>
             </a:extLst>
           </p:cNvPr>
@@ -2713,7 +2713,7 @@
           <p:cNvPr id="6" name="Footer Placeholder 5">
             <a:extLst>
               <a:ext uri="{FF2B5EF4-FFF2-40B4-BE49-F238E27FC236}">
-                <a16:creationId xmlns:a16="http://schemas.microsoft.com/office/drawing/2014/main" id="{88E8A9E2-FE0F-4480-BD73-821D830C3F09}"/>
+                <a16:creationId xmlns:a16="http://schemas.microsoft.com/office/drawing/2014/main" xmlns="" id="{88E8A9E2-FE0F-4480-BD73-821D830C3F09}"/>
               </a:ext>
             </a:extLst>
           </p:cNvPr>
@@ -2738,7 +2738,7 @@
           <p:cNvPr id="7" name="Slide Number Placeholder 6">
             <a:extLst>
               <a:ext uri="{FF2B5EF4-FFF2-40B4-BE49-F238E27FC236}">
-                <a16:creationId xmlns:a16="http://schemas.microsoft.com/office/drawing/2014/main" id="{7AEF6031-88CD-482E-B6F1-5C065CF67125}"/>
+                <a16:creationId xmlns:a16="http://schemas.microsoft.com/office/drawing/2014/main" xmlns="" id="{7AEF6031-88CD-482E-B6F1-5C065CF67125}"/>
               </a:ext>
             </a:extLst>
           </p:cNvPr>
@@ -2802,7 +2802,7 @@
           <p:cNvPr id="2" name="Title Placeholder 1">
             <a:extLst>
               <a:ext uri="{FF2B5EF4-FFF2-40B4-BE49-F238E27FC236}">
-                <a16:creationId xmlns:a16="http://schemas.microsoft.com/office/drawing/2014/main" id="{2C176F0B-FE38-4CBC-949D-8C23FFCD2FA5}"/>
+                <a16:creationId xmlns:a16="http://schemas.microsoft.com/office/drawing/2014/main" xmlns="" id="{2C176F0B-FE38-4CBC-949D-8C23FFCD2FA5}"/>
               </a:ext>
             </a:extLst>
           </p:cNvPr>
@@ -2841,7 +2841,7 @@
           <p:cNvPr id="3" name="Text Placeholder 2">
             <a:extLst>
               <a:ext uri="{FF2B5EF4-FFF2-40B4-BE49-F238E27FC236}">
-                <a16:creationId xmlns:a16="http://schemas.microsoft.com/office/drawing/2014/main" id="{0F382082-7FDE-47C3-B86D-0E29020E6C6D}"/>
+                <a16:creationId xmlns:a16="http://schemas.microsoft.com/office/drawing/2014/main" xmlns="" id="{0F382082-7FDE-47C3-B86D-0E29020E6C6D}"/>
               </a:ext>
             </a:extLst>
           </p:cNvPr>
@@ -2909,7 +2909,7 @@
           <p:cNvPr id="4" name="Date Placeholder 3">
             <a:extLst>
               <a:ext uri="{FF2B5EF4-FFF2-40B4-BE49-F238E27FC236}">
-                <a16:creationId xmlns:a16="http://schemas.microsoft.com/office/drawing/2014/main" id="{D8604926-417B-4158-A6D8-C0255420604B}"/>
+                <a16:creationId xmlns:a16="http://schemas.microsoft.com/office/drawing/2014/main" xmlns="" id="{D8604926-417B-4158-A6D8-C0255420604B}"/>
               </a:ext>
             </a:extLst>
           </p:cNvPr>
@@ -2956,7 +2956,7 @@
           <p:cNvPr id="5" name="Footer Placeholder 4">
             <a:extLst>
               <a:ext uri="{FF2B5EF4-FFF2-40B4-BE49-F238E27FC236}">
-                <a16:creationId xmlns:a16="http://schemas.microsoft.com/office/drawing/2014/main" id="{AE5C1160-6848-4B81-A5D4-8A970D2C61F8}"/>
+                <a16:creationId xmlns:a16="http://schemas.microsoft.com/office/drawing/2014/main" xmlns="" id="{AE5C1160-6848-4B81-A5D4-8A970D2C61F8}"/>
               </a:ext>
             </a:extLst>
           </p:cNvPr>
@@ -2999,7 +2999,7 @@
           <p:cNvPr id="6" name="Slide Number Placeholder 5">
             <a:extLst>
               <a:ext uri="{FF2B5EF4-FFF2-40B4-BE49-F238E27FC236}">
-                <a16:creationId xmlns:a16="http://schemas.microsoft.com/office/drawing/2014/main" id="{3723DDA1-AD58-4A0C-92AA-BAD77CECC145}"/>
+                <a16:creationId xmlns:a16="http://schemas.microsoft.com/office/drawing/2014/main" xmlns="" id="{3723DDA1-AD58-4A0C-92AA-BAD77CECC145}"/>
               </a:ext>
             </a:extLst>
           </p:cNvPr>
@@ -3364,10 +3364,10 @@
       </p:grpSpPr>
       <p:sp>
         <p:nvSpPr>
-          <p:cNvPr id="2" name="TextBox 1">
-            <a:extLst>
-              <a:ext uri="{FF2B5EF4-FFF2-40B4-BE49-F238E27FC236}">
-                <a16:creationId xmlns:a16="http://schemas.microsoft.com/office/drawing/2014/main" id="{EA9E5BAC-A7AC-494C-8850-9483578F5315}"/>
+          <p:cNvPr id="3" name="TextBox 2">
+            <a:extLst>
+              <a:ext uri="{FF2B5EF4-FFF2-40B4-BE49-F238E27FC236}">
+                <a16:creationId xmlns:a16="http://schemas.microsoft.com/office/drawing/2014/main" xmlns="" id="{38182274-44A8-4A5B-BE26-5B47DC6270FD}"/>
               </a:ext>
             </a:extLst>
           </p:cNvPr>
@@ -3376,8 +3376,8 @@
         </p:nvSpPr>
         <p:spPr>
           <a:xfrm>
-            <a:off x="3442517" y="3105834"/>
-            <a:ext cx="5306966" cy="646331"/>
+            <a:off x="3665620" y="99129"/>
+            <a:ext cx="4860758" cy="369332"/>
           </a:xfrm>
           <a:prstGeom prst="rect">
             <a:avLst/>
@@ -3385,7 +3385,7 @@
           <a:noFill/>
         </p:spPr>
         <p:txBody>
-          <a:bodyPr wrap="none" rtlCol="0">
+          <a:bodyPr wrap="square" rtlCol="0">
             <a:spAutoFit/>
           </a:bodyPr>
           <a:lstStyle/>
@@ -3393,30 +3393,83 @@
             <a:pPr algn="ctr"/>
             <a:r>
               <a:rPr lang="en-AU" dirty="0"/>
-              <a:t>If you run into any issues, post an issue on </a:t>
+              <a:t>Create Application in </a:t>
             </a:r>
             <a:r>
               <a:rPr lang="en-AU" dirty="0" err="1"/>
-              <a:t>Github</a:t>
+              <a:t>TTN</a:t>
             </a:r>
             <a:r>
               <a:rPr lang="en-AU" dirty="0"/>
-              <a:t> here</a:t>
-            </a:r>
-          </a:p>
-          <a:p>
-            <a:pPr algn="ctr"/>
-            <a:r>
-              <a:rPr lang="en-AU" dirty="0"/>
-              <a:t>https://github.com/MakerMeets/ttn/issues</a:t>
-            </a:r>
-          </a:p>
-        </p:txBody>
-      </p:sp>
+              <a:t> Console</a:t>
+            </a:r>
+          </a:p>
+        </p:txBody>
+      </p:sp>
+      <p:pic>
+        <p:nvPicPr>
+          <p:cNvPr id="4" name="Picture 3">
+            <a:extLst>
+              <a:ext uri="{FF2B5EF4-FFF2-40B4-BE49-F238E27FC236}">
+                <a16:creationId xmlns:a16="http://schemas.microsoft.com/office/drawing/2014/main" xmlns="" id="{E0270BB0-2ADE-48FE-A1FA-155994194A36}"/>
+              </a:ext>
+            </a:extLst>
+          </p:cNvPr>
+          <p:cNvPicPr>
+            <a:picLocks noChangeAspect="1"/>
+          </p:cNvPicPr>
+          <p:nvPr/>
+        </p:nvPicPr>
+        <p:blipFill>
+          <a:blip r:embed="rId2"/>
+          <a:stretch>
+            <a:fillRect/>
+          </a:stretch>
+        </p:blipFill>
+        <p:spPr>
+          <a:xfrm>
+            <a:off x="2095845" y="757102"/>
+            <a:ext cx="8000309" cy="5731565"/>
+          </a:xfrm>
+          <a:prstGeom prst="rect">
+            <a:avLst/>
+          </a:prstGeom>
+        </p:spPr>
+      </p:pic>
+      <p:pic>
+        <p:nvPicPr>
+          <p:cNvPr id="5" name="Picture 4">
+            <a:extLst>
+              <a:ext uri="{FF2B5EF4-FFF2-40B4-BE49-F238E27FC236}">
+                <a16:creationId xmlns:a16="http://schemas.microsoft.com/office/drawing/2014/main" xmlns="" id="{C259626A-ED3E-4AD7-96BA-D296AE413CEC}"/>
+              </a:ext>
+            </a:extLst>
+          </p:cNvPr>
+          <p:cNvPicPr>
+            <a:picLocks noChangeAspect="1"/>
+          </p:cNvPicPr>
+          <p:nvPr/>
+        </p:nvPicPr>
+        <p:blipFill>
+          <a:blip r:embed="rId3"/>
+          <a:stretch>
+            <a:fillRect/>
+          </a:stretch>
+        </p:blipFill>
+        <p:spPr>
+          <a:xfrm>
+            <a:off x="7216311" y="1167401"/>
+            <a:ext cx="2671358" cy="562007"/>
+          </a:xfrm>
+          <a:prstGeom prst="rect">
+            <a:avLst/>
+          </a:prstGeom>
+        </p:spPr>
+      </p:pic>
     </p:spTree>
     <p:extLst>
       <p:ext uri="{BB962C8B-B14F-4D97-AF65-F5344CB8AC3E}">
-        <p14:creationId xmlns:p14="http://schemas.microsoft.com/office/powerpoint/2010/main" val="475932334"/>
+        <p14:creationId xmlns:p14="http://schemas.microsoft.com/office/powerpoint/2010/main" val="3647661285"/>
       </p:ext>
     </p:extLst>
   </p:cSld>
@@ -3445,10 +3498,10 @@
       </p:grpSpPr>
       <p:pic>
         <p:nvPicPr>
-          <p:cNvPr id="3" name="Picture 2">
-            <a:extLst>
-              <a:ext uri="{FF2B5EF4-FFF2-40B4-BE49-F238E27FC236}">
-                <a16:creationId xmlns:a16="http://schemas.microsoft.com/office/drawing/2014/main" id="{962565EA-C1AB-480E-B974-499AA8C572BF}"/>
+          <p:cNvPr id="2" name="Picture 1">
+            <a:extLst>
+              <a:ext uri="{FF2B5EF4-FFF2-40B4-BE49-F238E27FC236}">
+                <a16:creationId xmlns:a16="http://schemas.microsoft.com/office/drawing/2014/main" xmlns="" id="{EE337903-3E66-49A5-BE73-28C5DEED4F16}"/>
               </a:ext>
             </a:extLst>
           </p:cNvPr>
@@ -3465,8 +3518,8 @@
         </p:blipFill>
         <p:spPr>
           <a:xfrm>
-            <a:off x="2414561" y="762000"/>
-            <a:ext cx="7362878" cy="6096000"/>
+            <a:off x="3571875" y="2686050"/>
+            <a:ext cx="5048250" cy="1485900"/>
           </a:xfrm>
           <a:prstGeom prst="rect">
             <a:avLst/>
@@ -3475,10 +3528,10 @@
       </p:pic>
       <p:sp>
         <p:nvSpPr>
-          <p:cNvPr id="4" name="TextBox 3">
-            <a:extLst>
-              <a:ext uri="{FF2B5EF4-FFF2-40B4-BE49-F238E27FC236}">
-                <a16:creationId xmlns:a16="http://schemas.microsoft.com/office/drawing/2014/main" id="{D16C63C8-1E3F-4DAE-90E5-93A1C62F90D6}"/>
+          <p:cNvPr id="3" name="TextBox 2">
+            <a:extLst>
+              <a:ext uri="{FF2B5EF4-FFF2-40B4-BE49-F238E27FC236}">
+                <a16:creationId xmlns:a16="http://schemas.microsoft.com/office/drawing/2014/main" xmlns="" id="{A2D73724-C930-4824-A612-87C6037F4E12}"/>
               </a:ext>
             </a:extLst>
           </p:cNvPr>
@@ -3504,15 +3557,20 @@
             <a:pPr algn="ctr"/>
             <a:r>
               <a:rPr lang="en-AU" dirty="0"/>
-              <a:t>Update config.py</a:t>
-            </a:r>
+              <a:t>Monitor </a:t>
+            </a:r>
+            <a:r>
+              <a:rPr lang="en-AU" dirty="0" err="1"/>
+              <a:t>REPL</a:t>
+            </a:r>
+            <a:endParaRPr lang="en-AU" dirty="0"/>
           </a:p>
         </p:txBody>
       </p:sp>
     </p:spTree>
     <p:extLst>
       <p:ext uri="{BB962C8B-B14F-4D97-AF65-F5344CB8AC3E}">
-        <p14:creationId xmlns:p14="http://schemas.microsoft.com/office/powerpoint/2010/main" val="2338549298"/>
+        <p14:creationId xmlns:p14="http://schemas.microsoft.com/office/powerpoint/2010/main" val="2298653518"/>
       </p:ext>
     </p:extLst>
   </p:cSld>
@@ -3539,81 +3597,389 @@
           <a:chExt cx="0" cy="0"/>
         </a:xfrm>
       </p:grpSpPr>
+      <p:sp>
+        <p:nvSpPr>
+          <p:cNvPr id="2" name="TextBox 1">
+            <a:extLst>
+              <a:ext uri="{FF2B5EF4-FFF2-40B4-BE49-F238E27FC236}">
+                <a16:creationId xmlns:a16="http://schemas.microsoft.com/office/drawing/2014/main" xmlns="" id="{31F1D3F5-7BDA-476D-9D6B-33A92930DABA}"/>
+              </a:ext>
+            </a:extLst>
+          </p:cNvPr>
+          <p:cNvSpPr txBox="1"/>
+          <p:nvPr/>
+        </p:nvSpPr>
+        <p:spPr>
+          <a:xfrm>
+            <a:off x="476250" y="60506"/>
+            <a:ext cx="11363325" cy="4801314"/>
+          </a:xfrm>
+          <a:prstGeom prst="rect">
+            <a:avLst/>
+          </a:prstGeom>
+          <a:noFill/>
+        </p:spPr>
+        <p:txBody>
+          <a:bodyPr wrap="square" rtlCol="0">
+            <a:spAutoFit/>
+          </a:bodyPr>
+          <a:lstStyle/>
+          <a:p>
+            <a:pPr algn="ctr"/>
+            <a:r>
+              <a:rPr lang="en-AU" dirty="0"/>
+              <a:t>Get TTN Mapper Phone </a:t>
+            </a:r>
+            <a:r>
+              <a:rPr lang="en-AU" dirty="0" smtClean="0"/>
+              <a:t>App (</a:t>
+            </a:r>
+            <a:r>
+              <a:rPr lang="en-AU" dirty="0" err="1" smtClean="0"/>
+              <a:t>Andriod</a:t>
+            </a:r>
+            <a:r>
+              <a:rPr lang="en-AU" dirty="0" smtClean="0"/>
+              <a:t> or iOS)</a:t>
+            </a:r>
+          </a:p>
+          <a:p>
+            <a:pPr marL="285750" indent="-285750" algn="ctr">
+              <a:buFont typeface="Arial" panose="020B0604020202020204" pitchFamily="34" charset="0"/>
+              <a:buChar char="•"/>
+            </a:pPr>
+            <a:r>
+              <a:rPr lang="en-AU" dirty="0" smtClean="0"/>
+              <a:t>Not </a:t>
+            </a:r>
+            <a:r>
+              <a:rPr lang="en-AU" dirty="0"/>
+              <a:t>needed if a GPS </a:t>
+            </a:r>
+            <a:r>
+              <a:rPr lang="en-AU" dirty="0" smtClean="0"/>
+              <a:t>module is </a:t>
+            </a:r>
+            <a:r>
+              <a:rPr lang="en-AU" dirty="0"/>
+              <a:t>used, although is handy for “observations</a:t>
+            </a:r>
+            <a:r>
+              <a:rPr lang="en-AU" dirty="0" smtClean="0"/>
+              <a:t>”</a:t>
+            </a:r>
+          </a:p>
+          <a:p>
+            <a:pPr marL="285750" indent="-285750" algn="ctr">
+              <a:buFont typeface="Arial" panose="020B0604020202020204" pitchFamily="34" charset="0"/>
+              <a:buChar char="•"/>
+            </a:pPr>
+            <a:endParaRPr lang="en-AU" dirty="0" smtClean="0"/>
+          </a:p>
+          <a:p>
+            <a:pPr marL="285750" indent="-285750">
+              <a:buFont typeface="Arial" panose="020B0604020202020204" pitchFamily="34" charset="0"/>
+              <a:buChar char="•"/>
+            </a:pPr>
+            <a:r>
+              <a:rPr lang="en-AU" b="1" dirty="0" smtClean="0"/>
+              <a:t>With GPS module:</a:t>
+            </a:r>
+            <a:r>
+              <a:rPr lang="en-AU" dirty="0" smtClean="0"/>
+              <a:t> If your </a:t>
+            </a:r>
+            <a:r>
+              <a:rPr lang="en-AU" dirty="0" err="1" smtClean="0"/>
+              <a:t>LoRa</a:t>
+            </a:r>
+            <a:r>
+              <a:rPr lang="en-AU" dirty="0" smtClean="0"/>
+              <a:t> device has a GPS the mobile phone App isn’t essential but a good visual aid to your track path (a lock of 3 satellites min. is required to record your track, </a:t>
+            </a:r>
+            <a:r>
+              <a:rPr lang="en-AU" dirty="0" err="1" smtClean="0"/>
+              <a:t>Pycom</a:t>
+            </a:r>
+            <a:r>
+              <a:rPr lang="en-AU" dirty="0" smtClean="0"/>
+              <a:t> LED will indicate good tracking)</a:t>
+            </a:r>
+          </a:p>
+          <a:p>
+            <a:pPr marL="285750" indent="-285750">
+              <a:buFont typeface="Arial" panose="020B0604020202020204" pitchFamily="34" charset="0"/>
+              <a:buChar char="•"/>
+            </a:pPr>
+            <a:r>
+              <a:rPr lang="en-AU" b="1" dirty="0" smtClean="0"/>
+              <a:t>Without </a:t>
+            </a:r>
+            <a:r>
+              <a:rPr lang="en-AU" b="1" dirty="0"/>
+              <a:t>GPS module:</a:t>
+            </a:r>
+            <a:r>
+              <a:rPr lang="en-AU" dirty="0"/>
+              <a:t> If </a:t>
+            </a:r>
+            <a:r>
+              <a:rPr lang="en-AU" dirty="0" smtClean="0"/>
+              <a:t>you don’t have a GPS on your </a:t>
+            </a:r>
+            <a:r>
+              <a:rPr lang="en-AU" dirty="0" err="1" smtClean="0"/>
+              <a:t>LoRa</a:t>
+            </a:r>
+            <a:r>
+              <a:rPr lang="en-AU" dirty="0" smtClean="0"/>
+              <a:t> device the mobile phone’s GPS is used for your location tracking.  So keep them “together” during your </a:t>
+            </a:r>
+            <a:r>
+              <a:rPr lang="en-AU" dirty="0" err="1" smtClean="0"/>
+              <a:t>LoRa</a:t>
+            </a:r>
+            <a:r>
+              <a:rPr lang="en-AU" dirty="0" smtClean="0"/>
+              <a:t> survey.</a:t>
+            </a:r>
+          </a:p>
+          <a:p>
+            <a:endParaRPr lang="en-AU" dirty="0" smtClean="0"/>
+          </a:p>
+          <a:p>
+            <a:r>
+              <a:rPr lang="en-AU" dirty="0" smtClean="0"/>
+              <a:t>See: </a:t>
+            </a:r>
+            <a:r>
+              <a:rPr lang="en-AU" dirty="0">
+                <a:hlinkClick r:id="rId2"/>
+              </a:rPr>
+              <a:t>https://www.thethingsnetwork.org/labs/story/using-ttnmapper-on-android</a:t>
+            </a:r>
+            <a:endParaRPr lang="en-AU" dirty="0"/>
+          </a:p>
+          <a:p>
+            <a:endParaRPr lang="en-AU" dirty="0" smtClean="0"/>
+          </a:p>
+          <a:p>
+            <a:r>
+              <a:rPr lang="en-AU" dirty="0" smtClean="0"/>
+              <a:t>Use </a:t>
+            </a:r>
+            <a:r>
+              <a:rPr lang="en-AU" dirty="0"/>
+              <a:t>this for generating a QR code </a:t>
+            </a:r>
+            <a:r>
+              <a:rPr lang="en-AU" dirty="0">
+                <a:hlinkClick r:id="rId3"/>
+              </a:rPr>
+              <a:t>https://www.qr-code-generator.com</a:t>
+            </a:r>
+            <a:r>
+              <a:rPr lang="en-AU" dirty="0" smtClean="0">
+                <a:hlinkClick r:id="rId3"/>
+              </a:rPr>
+              <a:t>/</a:t>
+            </a:r>
+            <a:endParaRPr lang="en-AU" dirty="0" smtClean="0"/>
+          </a:p>
+          <a:p>
+            <a:endParaRPr lang="en-AU" dirty="0"/>
+          </a:p>
+          <a:p>
+            <a:pPr algn="ctr"/>
+            <a:r>
+              <a:rPr lang="en-AU" dirty="0"/>
+              <a:t>Example format (modify to suit your own settings</a:t>
+            </a:r>
+            <a:r>
+              <a:rPr lang="en-AU" dirty="0" smtClean="0"/>
+              <a:t>)</a:t>
+            </a:r>
+            <a:endParaRPr lang="en-AU" dirty="0"/>
+          </a:p>
+          <a:p>
+            <a:r>
+              <a:rPr lang="en-AU" dirty="0"/>
+              <a:t>Format: </a:t>
+            </a:r>
+            <a:r>
+              <a:rPr lang="en-AU" dirty="0">
+                <a:solidFill>
+                  <a:schemeClr val="accent1"/>
+                </a:solidFill>
+              </a:rPr>
+              <a:t>https://</a:t>
+            </a:r>
+            <a:r>
+              <a:rPr lang="en-AU" dirty="0"/>
+              <a:t>{ttn-handler}</a:t>
+            </a:r>
+            <a:r>
+              <a:rPr lang="en-AU" dirty="0">
+                <a:solidFill>
+                  <a:schemeClr val="accent1"/>
+                </a:solidFill>
+              </a:rPr>
+              <a:t>:</a:t>
+            </a:r>
+            <a:r>
+              <a:rPr lang="en-AU" dirty="0"/>
+              <a:t>{ttn-appl-id}</a:t>
+            </a:r>
+            <a:r>
+              <a:rPr lang="en-AU" dirty="0">
+                <a:solidFill>
+                  <a:schemeClr val="accent1"/>
+                </a:solidFill>
+              </a:rPr>
+              <a:t>:</a:t>
+            </a:r>
+            <a:r>
+              <a:rPr lang="en-AU" dirty="0"/>
+              <a:t>{ttn-device-id}</a:t>
+            </a:r>
+            <a:r>
+              <a:rPr lang="en-AU" dirty="0">
+                <a:solidFill>
+                  <a:schemeClr val="accent1"/>
+                </a:solidFill>
+              </a:rPr>
+              <a:t>:</a:t>
+            </a:r>
+            <a:r>
+              <a:rPr lang="en-AU" dirty="0">
+                <a:solidFill>
+                  <a:srgbClr val="FF0000"/>
+                </a:solidFill>
+              </a:rPr>
+              <a:t>{</a:t>
+            </a:r>
+            <a:r>
+              <a:rPr lang="en-AU" dirty="0" smtClean="0">
+                <a:solidFill>
+                  <a:srgbClr val="FF0000"/>
+                </a:solidFill>
+              </a:rPr>
+              <a:t>ttn-appl-access-key*}</a:t>
+            </a:r>
+          </a:p>
+          <a:p>
+            <a:r>
+              <a:rPr lang="en-AU" dirty="0" smtClean="0"/>
+              <a:t>Example:</a:t>
+            </a:r>
+            <a:r>
+              <a:rPr lang="en-AU" dirty="0" smtClean="0">
+                <a:solidFill>
+                  <a:srgbClr val="FF0000"/>
+                </a:solidFill>
+              </a:rPr>
+              <a:t> </a:t>
+            </a:r>
+            <a:r>
+              <a:rPr lang="en-AU" dirty="0" smtClean="0">
+                <a:hlinkClick r:id="rId4"/>
+              </a:rPr>
+              <a:t>http</a:t>
+            </a:r>
+            <a:r>
+              <a:rPr lang="en-AU" dirty="0">
+                <a:hlinkClick r:id="rId4"/>
+              </a:rPr>
+              <a:t>://asia-se.thethings.network:ttn-mapper-123:ttn-mapper-device-1:ttn-account-v2.oq1wWxXXX</a:t>
+            </a:r>
+            <a:endParaRPr lang="en-AU" dirty="0"/>
+          </a:p>
+          <a:p>
+            <a:pPr algn="ctr"/>
+            <a:endParaRPr lang="en-AU" dirty="0">
+              <a:solidFill>
+                <a:srgbClr val="FF0000"/>
+              </a:solidFill>
+            </a:endParaRPr>
+          </a:p>
+          <a:p>
+            <a:pPr algn="ctr"/>
+            <a:r>
+              <a:rPr lang="en-AU" dirty="0" smtClean="0">
+                <a:solidFill>
+                  <a:srgbClr val="FF0000"/>
+                </a:solidFill>
+              </a:rPr>
+              <a:t>WARNING: Don’t share your </a:t>
+            </a:r>
+            <a:r>
+              <a:rPr lang="en-AU" dirty="0" err="1" smtClean="0">
+                <a:solidFill>
+                  <a:srgbClr val="FF0000"/>
+                </a:solidFill>
+              </a:rPr>
+              <a:t>ttn</a:t>
+            </a:r>
+            <a:r>
+              <a:rPr lang="en-AU" dirty="0" smtClean="0">
+                <a:solidFill>
+                  <a:srgbClr val="FF0000"/>
+                </a:solidFill>
+              </a:rPr>
+              <a:t>-</a:t>
+            </a:r>
+            <a:r>
+              <a:rPr lang="en-AU" dirty="0" err="1" smtClean="0">
+                <a:solidFill>
+                  <a:srgbClr val="FF0000"/>
+                </a:solidFill>
+              </a:rPr>
+              <a:t>appl</a:t>
+            </a:r>
+            <a:r>
+              <a:rPr lang="en-AU" dirty="0" smtClean="0">
+                <a:solidFill>
+                  <a:srgbClr val="FF0000"/>
+                </a:solidFill>
+              </a:rPr>
+              <a:t>-access-key on publically</a:t>
+            </a:r>
+            <a:endParaRPr lang="en-AU" dirty="0">
+              <a:solidFill>
+                <a:srgbClr val="FF0000"/>
+              </a:solidFill>
+            </a:endParaRPr>
+          </a:p>
+        </p:txBody>
+      </p:sp>
       <p:pic>
         <p:nvPicPr>
-          <p:cNvPr id="2" name="Picture 1">
-            <a:extLst>
-              <a:ext uri="{FF2B5EF4-FFF2-40B4-BE49-F238E27FC236}">
-                <a16:creationId xmlns:a16="http://schemas.microsoft.com/office/drawing/2014/main" id="{EE337903-3E66-49A5-BE73-28C5DEED4F16}"/>
-              </a:ext>
-            </a:extLst>
-          </p:cNvPr>
+          <p:cNvPr id="6" name="Picture 5"/>
           <p:cNvPicPr>
             <a:picLocks noChangeAspect="1"/>
           </p:cNvPicPr>
           <p:nvPr/>
         </p:nvPicPr>
         <p:blipFill>
-          <a:blip r:embed="rId2"/>
+          <a:blip r:embed="rId5"/>
           <a:stretch>
             <a:fillRect/>
           </a:stretch>
         </p:blipFill>
         <p:spPr>
           <a:xfrm>
-            <a:off x="3571875" y="2686050"/>
-            <a:ext cx="5048250" cy="1485900"/>
+            <a:off x="3258432" y="4752975"/>
+            <a:ext cx="5960195" cy="1847039"/>
           </a:xfrm>
           <a:prstGeom prst="rect">
             <a:avLst/>
           </a:prstGeom>
         </p:spPr>
       </p:pic>
-      <p:sp>
-        <p:nvSpPr>
-          <p:cNvPr id="3" name="TextBox 2">
-            <a:extLst>
-              <a:ext uri="{FF2B5EF4-FFF2-40B4-BE49-F238E27FC236}">
-                <a16:creationId xmlns:a16="http://schemas.microsoft.com/office/drawing/2014/main" id="{A2D73724-C930-4824-A612-87C6037F4E12}"/>
-              </a:ext>
-            </a:extLst>
-          </p:cNvPr>
-          <p:cNvSpPr txBox="1"/>
-          <p:nvPr/>
-        </p:nvSpPr>
-        <p:spPr>
-          <a:xfrm>
-            <a:off x="3665621" y="60506"/>
-            <a:ext cx="4860758" cy="369332"/>
-          </a:xfrm>
-          <a:prstGeom prst="rect">
-            <a:avLst/>
-          </a:prstGeom>
-          <a:noFill/>
-        </p:spPr>
-        <p:txBody>
-          <a:bodyPr wrap="square" rtlCol="0">
-            <a:spAutoFit/>
-          </a:bodyPr>
-          <a:lstStyle/>
-          <a:p>
-            <a:pPr algn="ctr"/>
-            <a:r>
-              <a:rPr lang="en-AU" dirty="0"/>
-              <a:t>Monitor </a:t>
-            </a:r>
-            <a:r>
-              <a:rPr lang="en-AU" dirty="0" err="1"/>
-              <a:t>REPL</a:t>
-            </a:r>
-            <a:endParaRPr lang="en-AU" dirty="0"/>
-          </a:p>
-        </p:txBody>
-      </p:sp>
     </p:spTree>
     <p:extLst>
       <p:ext uri="{BB962C8B-B14F-4D97-AF65-F5344CB8AC3E}">
-        <p14:creationId xmlns:p14="http://schemas.microsoft.com/office/powerpoint/2010/main" val="2298653518"/>
+        <p14:creationId xmlns:p14="http://schemas.microsoft.com/office/powerpoint/2010/main" val="1689351667"/>
       </p:ext>
     </p:extLst>
   </p:cSld>
@@ -3640,12 +4006,42 @@
           <a:chExt cx="0" cy="0"/>
         </a:xfrm>
       </p:grpSpPr>
-      <p:sp>
-        <p:nvSpPr>
-          <p:cNvPr id="2" name="TextBox 1">
-            <a:extLst>
-              <a:ext uri="{FF2B5EF4-FFF2-40B4-BE49-F238E27FC236}">
-                <a16:creationId xmlns:a16="http://schemas.microsoft.com/office/drawing/2014/main" id="{31F1D3F5-7BDA-476D-9D6B-33A92930DABA}"/>
+      <p:pic>
+        <p:nvPicPr>
+          <p:cNvPr id="2" name="Picture 1">
+            <a:extLst>
+              <a:ext uri="{FF2B5EF4-FFF2-40B4-BE49-F238E27FC236}">
+                <a16:creationId xmlns:a16="http://schemas.microsoft.com/office/drawing/2014/main" xmlns="" id="{377902AA-8382-4123-B0E8-4FE779A84438}"/>
+              </a:ext>
+            </a:extLst>
+          </p:cNvPr>
+          <p:cNvPicPr>
+            <a:picLocks noChangeAspect="1"/>
+          </p:cNvPicPr>
+          <p:nvPr/>
+        </p:nvPicPr>
+        <p:blipFill>
+          <a:blip r:embed="rId2"/>
+          <a:stretch>
+            <a:fillRect/>
+          </a:stretch>
+        </p:blipFill>
+        <p:spPr>
+          <a:xfrm>
+            <a:off x="2187491" y="834886"/>
+            <a:ext cx="7817016" cy="5830957"/>
+          </a:xfrm>
+          <a:prstGeom prst="rect">
+            <a:avLst/>
+          </a:prstGeom>
+        </p:spPr>
+      </p:pic>
+      <p:sp>
+        <p:nvSpPr>
+          <p:cNvPr id="3" name="TextBox 2">
+            <a:extLst>
+              <a:ext uri="{FF2B5EF4-FFF2-40B4-BE49-F238E27FC236}">
+                <a16:creationId xmlns:a16="http://schemas.microsoft.com/office/drawing/2014/main" xmlns="" id="{CDD36FC7-A96B-40BD-8C27-775596A32DB7}"/>
               </a:ext>
             </a:extLst>
           </p:cNvPr>
@@ -3654,8 +4050,8 @@
         </p:nvSpPr>
         <p:spPr>
           <a:xfrm>
-            <a:off x="3665621" y="60506"/>
-            <a:ext cx="4860758" cy="369332"/>
+            <a:off x="3270771" y="106888"/>
+            <a:ext cx="5650457" cy="369332"/>
           </a:xfrm>
           <a:prstGeom prst="rect">
             <a:avLst/>
@@ -3671,7 +4067,7 @@
             <a:pPr algn="ctr"/>
             <a:r>
               <a:rPr lang="en-AU" dirty="0"/>
-              <a:t>Get </a:t>
+              <a:t>Monitor </a:t>
             </a:r>
             <a:r>
               <a:rPr lang="en-AU" dirty="0" err="1"/>
@@ -3679,126 +4075,7 @@
             </a:r>
             <a:r>
               <a:rPr lang="en-AU" dirty="0"/>
-              <a:t> Mapper Phone App</a:t>
-            </a:r>
-          </a:p>
-        </p:txBody>
-      </p:sp>
-      <p:sp>
-        <p:nvSpPr>
-          <p:cNvPr id="3" name="Rectangle 2">
-            <a:extLst>
-              <a:ext uri="{FF2B5EF4-FFF2-40B4-BE49-F238E27FC236}">
-                <a16:creationId xmlns:a16="http://schemas.microsoft.com/office/drawing/2014/main" id="{93DB0F37-313D-41BB-AF91-00443B48A5D1}"/>
-              </a:ext>
-            </a:extLst>
-          </p:cNvPr>
-          <p:cNvSpPr/>
-          <p:nvPr/>
-        </p:nvSpPr>
-        <p:spPr>
-          <a:xfrm>
-            <a:off x="1351945" y="3945756"/>
-            <a:ext cx="9488110" cy="646331"/>
-          </a:xfrm>
-          <a:prstGeom prst="rect">
-            <a:avLst/>
-          </a:prstGeom>
-        </p:spPr>
-        <p:txBody>
-          <a:bodyPr wrap="none">
-            <a:spAutoFit/>
-          </a:bodyPr>
-          <a:lstStyle/>
-          <a:p>
-            <a:pPr algn="ctr"/>
-            <a:r>
-              <a:rPr lang="en-AU" dirty="0"/>
-              <a:t>Example format (modify to suit your own settings)</a:t>
-            </a:r>
-          </a:p>
-          <a:p>
-            <a:pPr algn="ctr"/>
-            <a:r>
-              <a:rPr lang="en-AU" dirty="0"/>
-              <a:t>http://asia-se.thethings.network:ttn-mapper-123:ttn-mapper-device-1:ttn-account-v2.oq1wWxXXX</a:t>
-            </a:r>
-          </a:p>
-        </p:txBody>
-      </p:sp>
-      <p:sp>
-        <p:nvSpPr>
-          <p:cNvPr id="4" name="Rectangle 3">
-            <a:extLst>
-              <a:ext uri="{FF2B5EF4-FFF2-40B4-BE49-F238E27FC236}">
-                <a16:creationId xmlns:a16="http://schemas.microsoft.com/office/drawing/2014/main" id="{D553E42E-665B-44FB-8C6B-73D348F5C85D}"/>
-              </a:ext>
-            </a:extLst>
-          </p:cNvPr>
-          <p:cNvSpPr/>
-          <p:nvPr/>
-        </p:nvSpPr>
-        <p:spPr>
-          <a:xfrm>
-            <a:off x="2685162" y="2884180"/>
-            <a:ext cx="6821676" cy="369332"/>
-          </a:xfrm>
-          <a:prstGeom prst="rect">
-            <a:avLst/>
-          </a:prstGeom>
-        </p:spPr>
-        <p:txBody>
-          <a:bodyPr wrap="none">
-            <a:spAutoFit/>
-          </a:bodyPr>
-          <a:lstStyle/>
-          <a:p>
-            <a:r>
-              <a:rPr lang="en-AU" dirty="0"/>
-              <a:t>Use this for generating a </a:t>
-            </a:r>
-            <a:r>
-              <a:rPr lang="en-AU" dirty="0" err="1"/>
-              <a:t>QR</a:t>
-            </a:r>
-            <a:r>
-              <a:rPr lang="en-AU" dirty="0"/>
-              <a:t> code https://www.qr-code-generator.com/</a:t>
-            </a:r>
-          </a:p>
-        </p:txBody>
-      </p:sp>
-      <p:sp>
-        <p:nvSpPr>
-          <p:cNvPr id="5" name="TextBox 4">
-            <a:extLst>
-              <a:ext uri="{FF2B5EF4-FFF2-40B4-BE49-F238E27FC236}">
-                <a16:creationId xmlns:a16="http://schemas.microsoft.com/office/drawing/2014/main" id="{F4EF982D-BBBD-4B72-987B-EF0D9C3E6891}"/>
-              </a:ext>
-            </a:extLst>
-          </p:cNvPr>
-          <p:cNvSpPr txBox="1"/>
-          <p:nvPr/>
-        </p:nvSpPr>
-        <p:spPr>
-          <a:xfrm>
-            <a:off x="2804766" y="1936616"/>
-            <a:ext cx="6582468" cy="369332"/>
-          </a:xfrm>
-          <a:prstGeom prst="rect">
-            <a:avLst/>
-          </a:prstGeom>
-          <a:noFill/>
-        </p:spPr>
-        <p:txBody>
-          <a:bodyPr wrap="square" rtlCol="0">
-            <a:spAutoFit/>
-          </a:bodyPr>
-          <a:lstStyle/>
-          <a:p>
-            <a:r>
-              <a:rPr lang="en-AU" dirty="0"/>
-              <a:t>* Not needed if a GPS is used, although is handy for “observations”</a:t>
+              <a:t> Console (when there is GPS reception)</a:t>
             </a:r>
           </a:p>
         </p:txBody>
@@ -3806,7 +4083,7 @@
     </p:spTree>
     <p:extLst>
       <p:ext uri="{BB962C8B-B14F-4D97-AF65-F5344CB8AC3E}">
-        <p14:creationId xmlns:p14="http://schemas.microsoft.com/office/powerpoint/2010/main" val="1689351667"/>
+        <p14:creationId xmlns:p14="http://schemas.microsoft.com/office/powerpoint/2010/main" val="117364053"/>
       </p:ext>
     </p:extLst>
   </p:cSld>
@@ -3835,10 +4112,10 @@
       </p:grpSpPr>
       <p:pic>
         <p:nvPicPr>
-          <p:cNvPr id="2" name="Picture 1">
-            <a:extLst>
-              <a:ext uri="{FF2B5EF4-FFF2-40B4-BE49-F238E27FC236}">
-                <a16:creationId xmlns:a16="http://schemas.microsoft.com/office/drawing/2014/main" id="{377902AA-8382-4123-B0E8-4FE779A84438}"/>
+          <p:cNvPr id="5" name="Picture 4">
+            <a:extLst>
+              <a:ext uri="{FF2B5EF4-FFF2-40B4-BE49-F238E27FC236}">
+                <a16:creationId xmlns:a16="http://schemas.microsoft.com/office/drawing/2014/main" xmlns="" id="{4C860010-7FD2-43FD-AC15-1C204BF3BEAF}"/>
               </a:ext>
             </a:extLst>
           </p:cNvPr>
@@ -3855,20 +4132,50 @@
         </p:blipFill>
         <p:spPr>
           <a:xfrm>
-            <a:off x="2187491" y="834886"/>
-            <a:ext cx="7817016" cy="5830957"/>
+            <a:off x="7123459" y="225288"/>
+            <a:ext cx="4905375" cy="3505200"/>
           </a:xfrm>
           <a:prstGeom prst="rect">
             <a:avLst/>
           </a:prstGeom>
         </p:spPr>
       </p:pic>
-      <p:sp>
-        <p:nvSpPr>
-          <p:cNvPr id="3" name="TextBox 2">
-            <a:extLst>
-              <a:ext uri="{FF2B5EF4-FFF2-40B4-BE49-F238E27FC236}">
-                <a16:creationId xmlns:a16="http://schemas.microsoft.com/office/drawing/2014/main" id="{CDD36FC7-A96B-40BD-8C27-775596A32DB7}"/>
+      <p:pic>
+        <p:nvPicPr>
+          <p:cNvPr id="6" name="Picture 5">
+            <a:extLst>
+              <a:ext uri="{FF2B5EF4-FFF2-40B4-BE49-F238E27FC236}">
+                <a16:creationId xmlns:a16="http://schemas.microsoft.com/office/drawing/2014/main" xmlns="" id="{626B97A3-1052-4AB2-AFD1-914F81007944}"/>
+              </a:ext>
+            </a:extLst>
+          </p:cNvPr>
+          <p:cNvPicPr>
+            <a:picLocks noChangeAspect="1"/>
+          </p:cNvPicPr>
+          <p:nvPr/>
+        </p:nvPicPr>
+        <p:blipFill>
+          <a:blip r:embed="rId3"/>
+          <a:stretch>
+            <a:fillRect/>
+          </a:stretch>
+        </p:blipFill>
+        <p:spPr>
+          <a:xfrm>
+            <a:off x="342461" y="1815548"/>
+            <a:ext cx="6144817" cy="4830418"/>
+          </a:xfrm>
+          <a:prstGeom prst="rect">
+            <a:avLst/>
+          </a:prstGeom>
+        </p:spPr>
+      </p:pic>
+      <p:sp>
+        <p:nvSpPr>
+          <p:cNvPr id="7" name="TextBox 6">
+            <a:extLst>
+              <a:ext uri="{FF2B5EF4-FFF2-40B4-BE49-F238E27FC236}">
+                <a16:creationId xmlns:a16="http://schemas.microsoft.com/office/drawing/2014/main" xmlns="" id="{1F0A7707-4E74-457D-B8AE-E9F58E7F9AA2}"/>
               </a:ext>
             </a:extLst>
           </p:cNvPr>
@@ -3877,7 +4184,7 @@
         </p:nvSpPr>
         <p:spPr>
           <a:xfrm>
-            <a:off x="3270771" y="106888"/>
+            <a:off x="163166" y="312296"/>
             <a:ext cx="5650457" cy="369332"/>
           </a:xfrm>
           <a:prstGeom prst="rect">
@@ -3894,23 +4201,233 @@
             <a:pPr algn="ctr"/>
             <a:r>
               <a:rPr lang="en-AU" dirty="0"/>
-              <a:t>Monitor </a:t>
+              <a:t>Hardware </a:t>
             </a:r>
             <a:r>
               <a:rPr lang="en-AU" dirty="0" err="1"/>
-              <a:t>TTN</a:t>
-            </a:r>
-            <a:r>
-              <a:rPr lang="en-AU" dirty="0"/>
-              <a:t> Console (when there is GPS reception)</a:t>
-            </a:r>
-          </a:p>
-        </p:txBody>
-      </p:sp>
+              <a:t>Hookup</a:t>
+            </a:r>
+            <a:endParaRPr lang="en-AU" dirty="0"/>
+          </a:p>
+        </p:txBody>
+      </p:sp>
+      <p:graphicFrame>
+        <p:nvGraphicFramePr>
+          <p:cNvPr id="2" name="Table 1"/>
+          <p:cNvGraphicFramePr>
+            <a:graphicFrameLocks noGrp="1"/>
+          </p:cNvGraphicFramePr>
+          <p:nvPr>
+            <p:extLst>
+              <p:ext uri="{D42A27DB-BD31-4B8C-83A1-F6EECF244321}">
+                <p14:modId xmlns:p14="http://schemas.microsoft.com/office/powerpoint/2010/main" val="2762878076"/>
+              </p:ext>
+            </p:extLst>
+          </p:nvPr>
+        </p:nvGraphicFramePr>
+        <p:xfrm>
+          <a:off x="7123460" y="4310591"/>
+          <a:ext cx="4905375" cy="1483360"/>
+        </p:xfrm>
+        <a:graphic>
+          <a:graphicData uri="http://schemas.openxmlformats.org/drawingml/2006/table">
+            <a:tbl>
+              <a:tblPr firstRow="1" bandRow="1">
+                <a:tableStyleId>{5C22544A-7EE6-4342-B048-85BDC9FD1C3A}</a:tableStyleId>
+              </a:tblPr>
+              <a:tblGrid>
+                <a:gridCol w="1635125"/>
+                <a:gridCol w="1635125"/>
+                <a:gridCol w="1635125"/>
+              </a:tblGrid>
+              <a:tr h="370840">
+                <a:tc>
+                  <a:txBody>
+                    <a:bodyPr/>
+                    <a:lstStyle/>
+                    <a:p>
+                      <a:r>
+                        <a:rPr lang="en-AU" dirty="0" err="1" smtClean="0"/>
+                        <a:t>Pycom</a:t>
+                      </a:r>
+                      <a:r>
+                        <a:rPr lang="en-AU" dirty="0" smtClean="0"/>
+                        <a:t> </a:t>
+                      </a:r>
+                      <a:r>
+                        <a:rPr lang="en-AU" dirty="0" err="1" smtClean="0"/>
+                        <a:t>Makr</a:t>
+                      </a:r>
+                      <a:endParaRPr lang="en-AU" dirty="0"/>
+                    </a:p>
+                  </a:txBody>
+                  <a:tcPr/>
+                </a:tc>
+                <a:tc>
+                  <a:txBody>
+                    <a:bodyPr/>
+                    <a:lstStyle/>
+                    <a:p>
+                      <a:r>
+                        <a:rPr lang="en-AU" dirty="0" smtClean="0"/>
+                        <a:t>Ultimate GPS</a:t>
+                      </a:r>
+                      <a:endParaRPr lang="en-AU" dirty="0"/>
+                    </a:p>
+                  </a:txBody>
+                  <a:tcPr/>
+                </a:tc>
+                <a:tc>
+                  <a:txBody>
+                    <a:bodyPr/>
+                    <a:lstStyle/>
+                    <a:p>
+                      <a:r>
+                        <a:rPr lang="en-AU" dirty="0" smtClean="0"/>
+                        <a:t>Note</a:t>
+                      </a:r>
+                      <a:endParaRPr lang="en-AU" dirty="0"/>
+                    </a:p>
+                  </a:txBody>
+                  <a:tcPr/>
+                </a:tc>
+              </a:tr>
+              <a:tr h="370840">
+                <a:tc>
+                  <a:txBody>
+                    <a:bodyPr/>
+                    <a:lstStyle/>
+                    <a:p>
+                      <a:r>
+                        <a:rPr lang="en-AU" dirty="0" smtClean="0"/>
+                        <a:t>5V</a:t>
+                      </a:r>
+                      <a:endParaRPr lang="en-AU" dirty="0"/>
+                    </a:p>
+                  </a:txBody>
+                  <a:tcPr/>
+                </a:tc>
+                <a:tc>
+                  <a:txBody>
+                    <a:bodyPr/>
+                    <a:lstStyle/>
+                    <a:p>
+                      <a:r>
+                        <a:rPr lang="en-AU" dirty="0" smtClean="0"/>
+                        <a:t>3.3V</a:t>
+                      </a:r>
+                      <a:endParaRPr lang="en-AU" dirty="0"/>
+                    </a:p>
+                  </a:txBody>
+                  <a:tcPr/>
+                </a:tc>
+                <a:tc>
+                  <a:txBody>
+                    <a:bodyPr/>
+                    <a:lstStyle/>
+                    <a:p>
+                      <a:r>
+                        <a:rPr lang="en-AU" dirty="0" smtClean="0"/>
+                        <a:t>Vin 3.3-5.5Vdc</a:t>
+                      </a:r>
+                      <a:endParaRPr lang="en-AU" dirty="0"/>
+                    </a:p>
+                  </a:txBody>
+                  <a:tcPr/>
+                </a:tc>
+              </a:tr>
+              <a:tr h="370840">
+                <a:tc>
+                  <a:txBody>
+                    <a:bodyPr/>
+                    <a:lstStyle/>
+                    <a:p>
+                      <a:r>
+                        <a:rPr lang="en-AU" dirty="0" smtClean="0"/>
+                        <a:t>GPIO11</a:t>
+                      </a:r>
+                      <a:endParaRPr lang="en-AU" dirty="0"/>
+                    </a:p>
+                  </a:txBody>
+                  <a:tcPr/>
+                </a:tc>
+                <a:tc>
+                  <a:txBody>
+                    <a:bodyPr/>
+                    <a:lstStyle/>
+                    <a:p>
+                      <a:r>
+                        <a:rPr lang="en-AU" dirty="0" smtClean="0"/>
+                        <a:t>TX</a:t>
+                      </a:r>
+                      <a:endParaRPr lang="en-AU" dirty="0"/>
+                    </a:p>
+                  </a:txBody>
+                  <a:tcPr/>
+                </a:tc>
+                <a:tc>
+                  <a:txBody>
+                    <a:bodyPr/>
+                    <a:lstStyle/>
+                    <a:p>
+                      <a:r>
+                        <a:rPr lang="en-AU" dirty="0" smtClean="0"/>
+                        <a:t>NMEA data</a:t>
+                      </a:r>
+                      <a:endParaRPr lang="en-AU" dirty="0"/>
+                    </a:p>
+                  </a:txBody>
+                  <a:tcPr/>
+                </a:tc>
+              </a:tr>
+              <a:tr h="370840">
+                <a:tc>
+                  <a:txBody>
+                    <a:bodyPr/>
+                    <a:lstStyle/>
+                    <a:p>
+                      <a:r>
+                        <a:rPr lang="en-AU" dirty="0" smtClean="0"/>
+                        <a:t>GND</a:t>
+                      </a:r>
+                      <a:endParaRPr lang="en-AU" dirty="0"/>
+                    </a:p>
+                  </a:txBody>
+                  <a:tcPr/>
+                </a:tc>
+                <a:tc>
+                  <a:txBody>
+                    <a:bodyPr/>
+                    <a:lstStyle/>
+                    <a:p>
+                      <a:r>
+                        <a:rPr lang="en-AU" dirty="0" smtClean="0"/>
+                        <a:t>GND</a:t>
+                      </a:r>
+                      <a:endParaRPr lang="en-AU" dirty="0"/>
+                    </a:p>
+                  </a:txBody>
+                  <a:tcPr/>
+                </a:tc>
+                <a:tc>
+                  <a:txBody>
+                    <a:bodyPr/>
+                    <a:lstStyle/>
+                    <a:p>
+                      <a:endParaRPr lang="en-AU" dirty="0"/>
+                    </a:p>
+                  </a:txBody>
+                  <a:tcPr/>
+                </a:tc>
+              </a:tr>
+            </a:tbl>
+          </a:graphicData>
+        </a:graphic>
+      </p:graphicFrame>
     </p:spTree>
     <p:extLst>
       <p:ext uri="{BB962C8B-B14F-4D97-AF65-F5344CB8AC3E}">
-        <p14:creationId xmlns:p14="http://schemas.microsoft.com/office/powerpoint/2010/main" val="117364053"/>
+        <p14:creationId xmlns:p14="http://schemas.microsoft.com/office/powerpoint/2010/main" val="3688057420"/>
       </p:ext>
     </p:extLst>
   </p:cSld>
@@ -3937,45 +4454,55 @@
           <a:chExt cx="0" cy="0"/>
         </a:xfrm>
       </p:grpSpPr>
+      <p:sp>
+        <p:nvSpPr>
+          <p:cNvPr id="2" name="Title 1"/>
+          <p:cNvSpPr>
+            <a:spLocks noGrp="1"/>
+          </p:cNvSpPr>
+          <p:nvPr>
+            <p:ph type="title"/>
+          </p:nvPr>
+        </p:nvSpPr>
+        <p:spPr/>
+        <p:txBody>
+          <a:bodyPr>
+            <a:normAutofit/>
+          </a:bodyPr>
+          <a:lstStyle/>
+          <a:p>
+            <a:r>
+              <a:rPr lang="en-AU" sz="1200" dirty="0" smtClean="0">
+                <a:hlinkClick r:id="rId2"/>
+              </a:rPr>
+              <a:t>https</a:t>
+            </a:r>
+            <a:r>
+              <a:rPr lang="en-AU" sz="1200" dirty="0">
+                <a:hlinkClick r:id="rId2"/>
+              </a:rPr>
+              <a:t>://</a:t>
+            </a:r>
+            <a:r>
+              <a:rPr lang="en-AU" sz="1200" dirty="0" smtClean="0">
+                <a:hlinkClick r:id="rId2"/>
+              </a:rPr>
+              <a:t>www.youtube.com/watch?v=Y9lMvyTYI3E</a:t>
+            </a:r>
+            <a:r>
+              <a:rPr lang="en-AU" sz="1200" dirty="0" smtClean="0"/>
+              <a:t/>
+            </a:r>
+            <a:br>
+              <a:rPr lang="en-AU" sz="1200" dirty="0" smtClean="0"/>
+            </a:br>
+            <a:endParaRPr lang="en-AU" sz="1200" dirty="0"/>
+          </a:p>
+        </p:txBody>
+      </p:sp>
       <p:pic>
         <p:nvPicPr>
-          <p:cNvPr id="5" name="Picture 4">
-            <a:extLst>
-              <a:ext uri="{FF2B5EF4-FFF2-40B4-BE49-F238E27FC236}">
-                <a16:creationId xmlns:a16="http://schemas.microsoft.com/office/drawing/2014/main" id="{4C860010-7FD2-43FD-AC15-1C204BF3BEAF}"/>
-              </a:ext>
-            </a:extLst>
-          </p:cNvPr>
-          <p:cNvPicPr>
-            <a:picLocks noChangeAspect="1"/>
-          </p:cNvPicPr>
-          <p:nvPr/>
-        </p:nvPicPr>
-        <p:blipFill>
-          <a:blip r:embed="rId2"/>
-          <a:stretch>
-            <a:fillRect/>
-          </a:stretch>
-        </p:blipFill>
-        <p:spPr>
-          <a:xfrm>
-            <a:off x="7123459" y="225288"/>
-            <a:ext cx="4905375" cy="3505200"/>
-          </a:xfrm>
-          <a:prstGeom prst="rect">
-            <a:avLst/>
-          </a:prstGeom>
-        </p:spPr>
-      </p:pic>
-      <p:pic>
-        <p:nvPicPr>
-          <p:cNvPr id="6" name="Picture 5">
-            <a:extLst>
-              <a:ext uri="{FF2B5EF4-FFF2-40B4-BE49-F238E27FC236}">
-                <a16:creationId xmlns:a16="http://schemas.microsoft.com/office/drawing/2014/main" id="{626B97A3-1052-4AB2-AFD1-914F81007944}"/>
-              </a:ext>
-            </a:extLst>
-          </p:cNvPr>
+          <p:cNvPr id="5" name="Picture 4"/>
           <p:cNvPicPr>
             <a:picLocks noChangeAspect="1"/>
           </p:cNvPicPr>
@@ -3989,8 +4516,8 @@
         </p:blipFill>
         <p:spPr>
           <a:xfrm>
-            <a:off x="342461" y="1815548"/>
-            <a:ext cx="6144817" cy="4830418"/>
+            <a:off x="914400" y="500062"/>
+            <a:ext cx="933450" cy="314325"/>
           </a:xfrm>
           <a:prstGeom prst="rect">
             <a:avLst/>
@@ -3999,49 +4526,104 @@
       </p:pic>
       <p:sp>
         <p:nvSpPr>
-          <p:cNvPr id="7" name="TextBox 6">
-            <a:extLst>
-              <a:ext uri="{FF2B5EF4-FFF2-40B4-BE49-F238E27FC236}">
-                <a16:creationId xmlns:a16="http://schemas.microsoft.com/office/drawing/2014/main" id="{1F0A7707-4E74-457D-B8AE-E9F58E7F9AA2}"/>
-              </a:ext>
-            </a:extLst>
-          </p:cNvPr>
-          <p:cNvSpPr txBox="1"/>
+          <p:cNvPr id="9" name="Content Placeholder 8"/>
+          <p:cNvSpPr>
+            <a:spLocks noGrp="1"/>
+          </p:cNvSpPr>
+          <p:nvPr>
+            <p:ph idx="1"/>
+          </p:nvPr>
+        </p:nvSpPr>
+        <p:spPr>
+          <a:xfrm>
+            <a:off x="7820024" y="5099243"/>
+            <a:ext cx="17747593" cy="5340467"/>
+          </a:xfrm>
+        </p:spPr>
+        <p:txBody>
+          <a:bodyPr/>
+          <a:lstStyle/>
+          <a:p>
+            <a:pPr marL="0" indent="0">
+              <a:buNone/>
+            </a:pPr>
+            <a:r>
+              <a:rPr lang="en-AU" dirty="0" smtClean="0"/>
+              <a:t> </a:t>
+            </a:r>
+            <a:endParaRPr lang="en-AU" dirty="0"/>
+          </a:p>
+        </p:txBody>
+      </p:sp>
+      <p:pic>
+        <p:nvPicPr>
+          <p:cNvPr id="10" name="Picture 9"/>
+          <p:cNvPicPr>
+            <a:picLocks noChangeAspect="1"/>
+          </p:cNvPicPr>
           <p:nvPr/>
-        </p:nvSpPr>
-        <p:spPr>
-          <a:xfrm>
-            <a:off x="163166" y="312296"/>
-            <a:ext cx="5650457" cy="369332"/>
+        </p:nvPicPr>
+        <p:blipFill>
+          <a:blip r:embed="rId4"/>
+          <a:stretch>
+            <a:fillRect/>
+          </a:stretch>
+        </p:blipFill>
+        <p:spPr>
+          <a:xfrm>
+            <a:off x="409270" y="1337958"/>
+            <a:ext cx="4363059" cy="4353533"/>
+          </a:xfrm>
+          <a:prstGeom prst="rect">
+            <a:avLst/>
+          </a:prstGeom>
+        </p:spPr>
+      </p:pic>
+      <p:pic>
+        <p:nvPicPr>
+          <p:cNvPr id="1026" name="Picture 2" descr="Image result for ttn mapper mobile"/>
+          <p:cNvPicPr>
+            <a:picLocks noChangeAspect="1" noChangeArrowheads="1"/>
+          </p:cNvPicPr>
+          <p:nvPr/>
+        </p:nvPicPr>
+        <p:blipFill>
+          <a:blip r:embed="rId5">
+            <a:extLst>
+              <a:ext uri="{28A0092B-C50C-407E-A947-70E740481C1C}">
+                <a14:useLocalDpi xmlns:a14="http://schemas.microsoft.com/office/drawing/2010/main" val="0"/>
+              </a:ext>
+            </a:extLst>
+          </a:blip>
+          <a:srcRect/>
+          <a:stretch>
+            <a:fillRect/>
+          </a:stretch>
+        </p:blipFill>
+        <p:spPr bwMode="auto">
+          <a:xfrm>
+            <a:off x="7137399" y="814387"/>
+            <a:ext cx="2797175" cy="4983474"/>
           </a:xfrm>
           <a:prstGeom prst="rect">
             <a:avLst/>
           </a:prstGeom>
           <a:noFill/>
-        </p:spPr>
-        <p:txBody>
-          <a:bodyPr wrap="square" rtlCol="0">
-            <a:spAutoFit/>
-          </a:bodyPr>
-          <a:lstStyle/>
-          <a:p>
-            <a:pPr algn="ctr"/>
-            <a:r>
-              <a:rPr lang="en-AU" dirty="0"/>
-              <a:t>Hardware </a:t>
-            </a:r>
-            <a:r>
-              <a:rPr lang="en-AU" dirty="0" err="1"/>
-              <a:t>Hookup</a:t>
-            </a:r>
-            <a:endParaRPr lang="en-AU" dirty="0"/>
-          </a:p>
-        </p:txBody>
-      </p:sp>
+          <a:extLst>
+            <a:ext uri="{909E8E84-426E-40DD-AFC4-6F175D3DCCD1}">
+              <a14:hiddenFill xmlns:a14="http://schemas.microsoft.com/office/drawing/2010/main">
+                <a:solidFill>
+                  <a:srgbClr val="FFFFFF"/>
+                </a:solidFill>
+              </a14:hiddenFill>
+            </a:ext>
+          </a:extLst>
+        </p:spPr>
+      </p:pic>
     </p:spTree>
     <p:extLst>
       <p:ext uri="{BB962C8B-B14F-4D97-AF65-F5344CB8AC3E}">
-        <p14:creationId xmlns:p14="http://schemas.microsoft.com/office/powerpoint/2010/main" val="3688057420"/>
+        <p14:creationId xmlns:p14="http://schemas.microsoft.com/office/powerpoint/2010/main" val="2697544436"/>
       </p:ext>
     </p:extLst>
   </p:cSld>
@@ -4073,7 +4655,7 @@
           <p:cNvPr id="4" name="Picture 3">
             <a:extLst>
               <a:ext uri="{FF2B5EF4-FFF2-40B4-BE49-F238E27FC236}">
-                <a16:creationId xmlns:a16="http://schemas.microsoft.com/office/drawing/2014/main" id="{D3FC8D75-2D66-4D81-8930-526FE4BA3330}"/>
+                <a16:creationId xmlns:a16="http://schemas.microsoft.com/office/drawing/2014/main" xmlns="" id="{D3FC8D75-2D66-4D81-8930-526FE4BA3330}"/>
               </a:ext>
             </a:extLst>
           </p:cNvPr>
@@ -4133,7 +4715,7 @@
           <p:cNvPr id="2" name="Picture 1">
             <a:extLst>
               <a:ext uri="{FF2B5EF4-FFF2-40B4-BE49-F238E27FC236}">
-                <a16:creationId xmlns:a16="http://schemas.microsoft.com/office/drawing/2014/main" id="{3AFD8CD7-A8B7-4717-A94C-993C0C664094}"/>
+                <a16:creationId xmlns:a16="http://schemas.microsoft.com/office/drawing/2014/main" xmlns="" id="{3AFD8CD7-A8B7-4717-A94C-993C0C664094}"/>
               </a:ext>
             </a:extLst>
           </p:cNvPr>
@@ -4163,7 +4745,7 @@
           <p:cNvPr id="3" name="Picture 2">
             <a:extLst>
               <a:ext uri="{FF2B5EF4-FFF2-40B4-BE49-F238E27FC236}">
-                <a16:creationId xmlns:a16="http://schemas.microsoft.com/office/drawing/2014/main" id="{C9D4FF2D-17F5-4996-A90F-C0C6584736C1}"/>
+                <a16:creationId xmlns:a16="http://schemas.microsoft.com/office/drawing/2014/main" xmlns="" id="{C9D4FF2D-17F5-4996-A90F-C0C6584736C1}"/>
               </a:ext>
             </a:extLst>
           </p:cNvPr>
@@ -4193,7 +4775,7 @@
           <p:cNvPr id="5" name="Picture 4">
             <a:extLst>
               <a:ext uri="{FF2B5EF4-FFF2-40B4-BE49-F238E27FC236}">
-                <a16:creationId xmlns:a16="http://schemas.microsoft.com/office/drawing/2014/main" id="{C4C674D5-2C55-4BFC-B78A-39ACCD908B37}"/>
+                <a16:creationId xmlns:a16="http://schemas.microsoft.com/office/drawing/2014/main" xmlns="" id="{C4C674D5-2C55-4BFC-B78A-39ACCD908B37}"/>
               </a:ext>
             </a:extLst>
           </p:cNvPr>
@@ -4248,56 +4830,12 @@
           <a:chExt cx="0" cy="0"/>
         </a:xfrm>
       </p:grpSpPr>
-      <p:sp>
-        <p:nvSpPr>
-          <p:cNvPr id="3" name="TextBox 2">
-            <a:extLst>
-              <a:ext uri="{FF2B5EF4-FFF2-40B4-BE49-F238E27FC236}">
-                <a16:creationId xmlns:a16="http://schemas.microsoft.com/office/drawing/2014/main" id="{38182274-44A8-4A5B-BE26-5B47DC6270FD}"/>
-              </a:ext>
-            </a:extLst>
-          </p:cNvPr>
-          <p:cNvSpPr txBox="1"/>
-          <p:nvPr/>
-        </p:nvSpPr>
-        <p:spPr>
-          <a:xfrm>
-            <a:off x="3665620" y="99129"/>
-            <a:ext cx="4860758" cy="369332"/>
-          </a:xfrm>
-          <a:prstGeom prst="rect">
-            <a:avLst/>
-          </a:prstGeom>
-          <a:noFill/>
-        </p:spPr>
-        <p:txBody>
-          <a:bodyPr wrap="square" rtlCol="0">
-            <a:spAutoFit/>
-          </a:bodyPr>
-          <a:lstStyle/>
-          <a:p>
-            <a:pPr algn="ctr"/>
-            <a:r>
-              <a:rPr lang="en-AU" dirty="0"/>
-              <a:t>Create Application in </a:t>
-            </a:r>
-            <a:r>
-              <a:rPr lang="en-AU" dirty="0" err="1"/>
-              <a:t>TTN</a:t>
-            </a:r>
-            <a:r>
-              <a:rPr lang="en-AU" dirty="0"/>
-              <a:t> Console</a:t>
-            </a:r>
-          </a:p>
-        </p:txBody>
-      </p:sp>
       <p:pic>
         <p:nvPicPr>
-          <p:cNvPr id="4" name="Picture 3">
-            <a:extLst>
-              <a:ext uri="{FF2B5EF4-FFF2-40B4-BE49-F238E27FC236}">
-                <a16:creationId xmlns:a16="http://schemas.microsoft.com/office/drawing/2014/main" id="{E0270BB0-2ADE-48FE-A1FA-155994194A36}"/>
+          <p:cNvPr id="2" name="Picture 1">
+            <a:extLst>
+              <a:ext uri="{FF2B5EF4-FFF2-40B4-BE49-F238E27FC236}">
+                <a16:creationId xmlns:a16="http://schemas.microsoft.com/office/drawing/2014/main" xmlns="" id="{B30988B0-8686-4ECB-BE39-ADD3E50CE130}"/>
               </a:ext>
             </a:extLst>
           </p:cNvPr>
@@ -4314,8 +4852,8 @@
         </p:blipFill>
         <p:spPr>
           <a:xfrm>
-            <a:off x="2095845" y="757102"/>
-            <a:ext cx="8000309" cy="5731565"/>
+            <a:off x="3082978" y="746895"/>
+            <a:ext cx="6884298" cy="1948386"/>
           </a:xfrm>
           <a:prstGeom prst="rect">
             <a:avLst/>
@@ -4324,10 +4862,10 @@
       </p:pic>
       <p:pic>
         <p:nvPicPr>
-          <p:cNvPr id="5" name="Picture 4">
-            <a:extLst>
-              <a:ext uri="{FF2B5EF4-FFF2-40B4-BE49-F238E27FC236}">
-                <a16:creationId xmlns:a16="http://schemas.microsoft.com/office/drawing/2014/main" id="{C259626A-ED3E-4AD7-96BA-D296AE413CEC}"/>
+          <p:cNvPr id="3" name="Picture 2">
+            <a:extLst>
+              <a:ext uri="{FF2B5EF4-FFF2-40B4-BE49-F238E27FC236}">
+                <a16:creationId xmlns:a16="http://schemas.microsoft.com/office/drawing/2014/main" xmlns="" id="{95CF6235-6DD4-471D-8946-4E7EB2E36F61}"/>
               </a:ext>
             </a:extLst>
           </p:cNvPr>
@@ -4344,18 +4882,62 @@
         </p:blipFill>
         <p:spPr>
           <a:xfrm>
-            <a:off x="7216311" y="1167401"/>
-            <a:ext cx="2671358" cy="562007"/>
+            <a:off x="3149032" y="2923475"/>
+            <a:ext cx="6752190" cy="3934525"/>
           </a:xfrm>
           <a:prstGeom prst="rect">
             <a:avLst/>
           </a:prstGeom>
         </p:spPr>
       </p:pic>
+      <p:sp>
+        <p:nvSpPr>
+          <p:cNvPr id="4" name="TextBox 3">
+            <a:extLst>
+              <a:ext uri="{FF2B5EF4-FFF2-40B4-BE49-F238E27FC236}">
+                <a16:creationId xmlns:a16="http://schemas.microsoft.com/office/drawing/2014/main" xmlns="" id="{93467CD8-7CBF-40E5-818C-16866F3A08E8}"/>
+              </a:ext>
+            </a:extLst>
+          </p:cNvPr>
+          <p:cNvSpPr txBox="1"/>
+          <p:nvPr/>
+        </p:nvSpPr>
+        <p:spPr>
+          <a:xfrm>
+            <a:off x="3665620" y="99129"/>
+            <a:ext cx="4860758" cy="369332"/>
+          </a:xfrm>
+          <a:prstGeom prst="rect">
+            <a:avLst/>
+          </a:prstGeom>
+          <a:noFill/>
+        </p:spPr>
+        <p:txBody>
+          <a:bodyPr wrap="square" rtlCol="0">
+            <a:spAutoFit/>
+          </a:bodyPr>
+          <a:lstStyle/>
+          <a:p>
+            <a:pPr algn="ctr"/>
+            <a:r>
+              <a:rPr lang="en-AU" dirty="0"/>
+              <a:t>Add the </a:t>
+            </a:r>
+            <a:r>
+              <a:rPr lang="en-AU" dirty="0" err="1"/>
+              <a:t>TTN</a:t>
+            </a:r>
+            <a:r>
+              <a:rPr lang="en-AU" dirty="0"/>
+              <a:t> Mapper Integration</a:t>
+            </a:r>
+          </a:p>
+        </p:txBody>
+      </p:sp>
     </p:spTree>
     <p:extLst>
       <p:ext uri="{BB962C8B-B14F-4D97-AF65-F5344CB8AC3E}">
-        <p14:creationId xmlns:p14="http://schemas.microsoft.com/office/powerpoint/2010/main" val="3647661285"/>
+        <p14:creationId xmlns:p14="http://schemas.microsoft.com/office/powerpoint/2010/main" val="3757440441"/>
       </p:ext>
     </p:extLst>
   </p:cSld>
@@ -4387,7 +4969,7 @@
           <p:cNvPr id="2" name="Picture 1">
             <a:extLst>
               <a:ext uri="{FF2B5EF4-FFF2-40B4-BE49-F238E27FC236}">
-                <a16:creationId xmlns:a16="http://schemas.microsoft.com/office/drawing/2014/main" id="{B30988B0-8686-4ECB-BE39-ADD3E50CE130}"/>
+                <a16:creationId xmlns:a16="http://schemas.microsoft.com/office/drawing/2014/main" xmlns="" id="{6D8F1184-E164-426C-B83B-D11FFD7771EF}"/>
               </a:ext>
             </a:extLst>
           </p:cNvPr>
@@ -4404,50 +4986,20 @@
         </p:blipFill>
         <p:spPr>
           <a:xfrm>
-            <a:off x="3082978" y="746895"/>
-            <a:ext cx="6884298" cy="1948386"/>
+            <a:off x="2523461" y="673768"/>
+            <a:ext cx="7145078" cy="6184232"/>
           </a:xfrm>
           <a:prstGeom prst="rect">
             <a:avLst/>
           </a:prstGeom>
         </p:spPr>
       </p:pic>
-      <p:pic>
-        <p:nvPicPr>
-          <p:cNvPr id="3" name="Picture 2">
-            <a:extLst>
-              <a:ext uri="{FF2B5EF4-FFF2-40B4-BE49-F238E27FC236}">
-                <a16:creationId xmlns:a16="http://schemas.microsoft.com/office/drawing/2014/main" id="{95CF6235-6DD4-471D-8946-4E7EB2E36F61}"/>
-              </a:ext>
-            </a:extLst>
-          </p:cNvPr>
-          <p:cNvPicPr>
-            <a:picLocks noChangeAspect="1"/>
-          </p:cNvPicPr>
-          <p:nvPr/>
-        </p:nvPicPr>
-        <p:blipFill>
-          <a:blip r:embed="rId3"/>
-          <a:stretch>
-            <a:fillRect/>
-          </a:stretch>
-        </p:blipFill>
-        <p:spPr>
-          <a:xfrm>
-            <a:off x="3149032" y="2923475"/>
-            <a:ext cx="6752190" cy="3934525"/>
-          </a:xfrm>
-          <a:prstGeom prst="rect">
-            <a:avLst/>
-          </a:prstGeom>
-        </p:spPr>
-      </p:pic>
-      <p:sp>
-        <p:nvSpPr>
-          <p:cNvPr id="4" name="TextBox 3">
-            <a:extLst>
-              <a:ext uri="{FF2B5EF4-FFF2-40B4-BE49-F238E27FC236}">
-                <a16:creationId xmlns:a16="http://schemas.microsoft.com/office/drawing/2014/main" id="{93467CD8-7CBF-40E5-818C-16866F3A08E8}"/>
+      <p:sp>
+        <p:nvSpPr>
+          <p:cNvPr id="3" name="TextBox 2">
+            <a:extLst>
+              <a:ext uri="{FF2B5EF4-FFF2-40B4-BE49-F238E27FC236}">
+                <a16:creationId xmlns:a16="http://schemas.microsoft.com/office/drawing/2014/main" xmlns="" id="{89605362-A0A9-42E4-BAD1-674013389775}"/>
               </a:ext>
             </a:extLst>
           </p:cNvPr>
@@ -4473,7 +5025,7 @@
             <a:pPr algn="ctr"/>
             <a:r>
               <a:rPr lang="en-AU" dirty="0"/>
-              <a:t>Add the </a:t>
+              <a:t>Configure </a:t>
             </a:r>
             <a:r>
               <a:rPr lang="en-AU" dirty="0" err="1"/>
@@ -4481,7 +5033,7 @@
             </a:r>
             <a:r>
               <a:rPr lang="en-AU" dirty="0"/>
-              <a:t> Mapper Integration</a:t>
+              <a:t> Mapper</a:t>
             </a:r>
           </a:p>
         </p:txBody>
@@ -4489,7 +5041,7 @@
     </p:spTree>
     <p:extLst>
       <p:ext uri="{BB962C8B-B14F-4D97-AF65-F5344CB8AC3E}">
-        <p14:creationId xmlns:p14="http://schemas.microsoft.com/office/powerpoint/2010/main" val="3757440441"/>
+        <p14:creationId xmlns:p14="http://schemas.microsoft.com/office/powerpoint/2010/main" val="3193922117"/>
       </p:ext>
     </p:extLst>
   </p:cSld>
@@ -4521,7 +5073,7 @@
           <p:cNvPr id="2" name="Picture 1">
             <a:extLst>
               <a:ext uri="{FF2B5EF4-FFF2-40B4-BE49-F238E27FC236}">
-                <a16:creationId xmlns:a16="http://schemas.microsoft.com/office/drawing/2014/main" id="{6D8F1184-E164-426C-B83B-D11FFD7771EF}"/>
+                <a16:creationId xmlns:a16="http://schemas.microsoft.com/office/drawing/2014/main" xmlns="" id="{7E5B1AA2-6D6B-42A5-ACA7-FB3B7D3FBD78}"/>
               </a:ext>
             </a:extLst>
           </p:cNvPr>
@@ -4538,8 +5090,8 @@
         </p:blipFill>
         <p:spPr>
           <a:xfrm>
-            <a:off x="2523461" y="673768"/>
-            <a:ext cx="7145078" cy="6184232"/>
+            <a:off x="3133398" y="872290"/>
+            <a:ext cx="5925204" cy="5925204"/>
           </a:xfrm>
           <a:prstGeom prst="rect">
             <a:avLst/>
@@ -4551,7 +5103,7 @@
           <p:cNvPr id="3" name="TextBox 2">
             <a:extLst>
               <a:ext uri="{FF2B5EF4-FFF2-40B4-BE49-F238E27FC236}">
-                <a16:creationId xmlns:a16="http://schemas.microsoft.com/office/drawing/2014/main" id="{89605362-A0A9-42E4-BAD1-674013389775}"/>
+                <a16:creationId xmlns:a16="http://schemas.microsoft.com/office/drawing/2014/main" xmlns="" id="{34A30802-FF1E-4FCB-A668-D55598546427}"/>
               </a:ext>
             </a:extLst>
           </p:cNvPr>
@@ -4560,7 +5112,7 @@
         </p:nvSpPr>
         <p:spPr>
           <a:xfrm>
-            <a:off x="3665620" y="99129"/>
+            <a:off x="3665621" y="60506"/>
             <a:ext cx="4860758" cy="369332"/>
           </a:xfrm>
           <a:prstGeom prst="rect">
@@ -4577,15 +5129,7 @@
             <a:pPr algn="ctr"/>
             <a:r>
               <a:rPr lang="en-AU" dirty="0"/>
-              <a:t>Configure </a:t>
-            </a:r>
-            <a:r>
-              <a:rPr lang="en-AU" dirty="0" err="1"/>
-              <a:t>TTN</a:t>
-            </a:r>
-            <a:r>
-              <a:rPr lang="en-AU" dirty="0"/>
-              <a:t> Mapper</a:t>
+              <a:t>Update the Encoder</a:t>
             </a:r>
           </a:p>
         </p:txBody>
@@ -4593,7 +5137,7 @@
     </p:spTree>
     <p:extLst>
       <p:ext uri="{BB962C8B-B14F-4D97-AF65-F5344CB8AC3E}">
-        <p14:creationId xmlns:p14="http://schemas.microsoft.com/office/powerpoint/2010/main" val="3193922117"/>
+        <p14:creationId xmlns:p14="http://schemas.microsoft.com/office/powerpoint/2010/main" val="985988207"/>
       </p:ext>
     </p:extLst>
   </p:cSld>
@@ -4625,7 +5169,7 @@
           <p:cNvPr id="2" name="Picture 1">
             <a:extLst>
               <a:ext uri="{FF2B5EF4-FFF2-40B4-BE49-F238E27FC236}">
-                <a16:creationId xmlns:a16="http://schemas.microsoft.com/office/drawing/2014/main" id="{7E5B1AA2-6D6B-42A5-ACA7-FB3B7D3FBD78}"/>
+                <a16:creationId xmlns:a16="http://schemas.microsoft.com/office/drawing/2014/main" xmlns="" id="{E146D30F-020E-4190-BC34-1E11D236E0DC}"/>
               </a:ext>
             </a:extLst>
           </p:cNvPr>
@@ -4642,8 +5186,8 @@
         </p:blipFill>
         <p:spPr>
           <a:xfrm>
-            <a:off x="3133398" y="872290"/>
-            <a:ext cx="5925204" cy="5925204"/>
+            <a:off x="1888610" y="881269"/>
+            <a:ext cx="8414779" cy="5883965"/>
           </a:xfrm>
           <a:prstGeom prst="rect">
             <a:avLst/>
@@ -4655,7 +5199,7 @@
           <p:cNvPr id="3" name="TextBox 2">
             <a:extLst>
               <a:ext uri="{FF2B5EF4-FFF2-40B4-BE49-F238E27FC236}">
-                <a16:creationId xmlns:a16="http://schemas.microsoft.com/office/drawing/2014/main" id="{34A30802-FF1E-4FCB-A668-D55598546427}"/>
+                <a16:creationId xmlns:a16="http://schemas.microsoft.com/office/drawing/2014/main" xmlns="" id="{83FB71F9-CFBC-44F1-8089-824BD1E90D54}"/>
               </a:ext>
             </a:extLst>
           </p:cNvPr>
@@ -4664,7 +5208,7 @@
         </p:nvSpPr>
         <p:spPr>
           <a:xfrm>
-            <a:off x="3665621" y="60506"/>
+            <a:off x="3665620" y="99129"/>
             <a:ext cx="4860758" cy="369332"/>
           </a:xfrm>
           <a:prstGeom prst="rect">
@@ -4681,7 +5225,7 @@
             <a:pPr algn="ctr"/>
             <a:r>
               <a:rPr lang="en-AU" dirty="0"/>
-              <a:t>Update the Encoder</a:t>
+              <a:t>Register a Device</a:t>
             </a:r>
           </a:p>
         </p:txBody>
@@ -4689,7 +5233,7 @@
     </p:spTree>
     <p:extLst>
       <p:ext uri="{BB962C8B-B14F-4D97-AF65-F5344CB8AC3E}">
-        <p14:creationId xmlns:p14="http://schemas.microsoft.com/office/powerpoint/2010/main" val="985988207"/>
+        <p14:creationId xmlns:p14="http://schemas.microsoft.com/office/powerpoint/2010/main" val="1111344884"/>
       </p:ext>
     </p:extLst>
   </p:cSld>
@@ -4716,12 +5260,53 @@
           <a:chExt cx="0" cy="0"/>
         </a:xfrm>
       </p:grpSpPr>
+      <p:sp>
+        <p:nvSpPr>
+          <p:cNvPr id="2" name="TextBox 1">
+            <a:extLst>
+              <a:ext uri="{FF2B5EF4-FFF2-40B4-BE49-F238E27FC236}">
+                <a16:creationId xmlns:a16="http://schemas.microsoft.com/office/drawing/2014/main" xmlns="" id="{32F71674-C97F-482E-B462-7B8D204792B3}"/>
+              </a:ext>
+            </a:extLst>
+          </p:cNvPr>
+          <p:cNvSpPr txBox="1"/>
+          <p:nvPr/>
+        </p:nvSpPr>
+        <p:spPr>
+          <a:xfrm>
+            <a:off x="3665621" y="60506"/>
+            <a:ext cx="4860758" cy="369332"/>
+          </a:xfrm>
+          <a:prstGeom prst="rect">
+            <a:avLst/>
+          </a:prstGeom>
+          <a:noFill/>
+        </p:spPr>
+        <p:txBody>
+          <a:bodyPr wrap="square" rtlCol="0">
+            <a:spAutoFit/>
+          </a:bodyPr>
+          <a:lstStyle/>
+          <a:p>
+            <a:pPr algn="ctr"/>
+            <a:r>
+              <a:rPr lang="en-AU" dirty="0"/>
+              <a:t>Get the Device </a:t>
+            </a:r>
+            <a:r>
+              <a:rPr lang="en-AU" dirty="0" err="1"/>
+              <a:t>EUI</a:t>
+            </a:r>
+            <a:endParaRPr lang="en-AU" dirty="0"/>
+          </a:p>
+        </p:txBody>
+      </p:sp>
       <p:pic>
         <p:nvPicPr>
-          <p:cNvPr id="2" name="Picture 1">
-            <a:extLst>
-              <a:ext uri="{FF2B5EF4-FFF2-40B4-BE49-F238E27FC236}">
-                <a16:creationId xmlns:a16="http://schemas.microsoft.com/office/drawing/2014/main" id="{E146D30F-020E-4190-BC34-1E11D236E0DC}"/>
+          <p:cNvPr id="6" name="Picture 5">
+            <a:extLst>
+              <a:ext uri="{FF2B5EF4-FFF2-40B4-BE49-F238E27FC236}">
+                <a16:creationId xmlns:a16="http://schemas.microsoft.com/office/drawing/2014/main" xmlns="" id="{DBE43A88-7652-45A1-923D-EAAD1054D6C0}"/>
               </a:ext>
             </a:extLst>
           </p:cNvPr>
@@ -4738,8 +5323,8 @@
         </p:blipFill>
         <p:spPr>
           <a:xfrm>
-            <a:off x="1888610" y="881269"/>
-            <a:ext cx="8414779" cy="5883965"/>
+            <a:off x="1471612" y="1231983"/>
+            <a:ext cx="9248775" cy="4562475"/>
           </a:xfrm>
           <a:prstGeom prst="rect">
             <a:avLst/>
@@ -4748,28 +5333,27 @@
       </p:pic>
       <p:sp>
         <p:nvSpPr>
-          <p:cNvPr id="3" name="TextBox 2">
-            <a:extLst>
-              <a:ext uri="{FF2B5EF4-FFF2-40B4-BE49-F238E27FC236}">
-                <a16:creationId xmlns:a16="http://schemas.microsoft.com/office/drawing/2014/main" id="{83FB71F9-CFBC-44F1-8089-824BD1E90D54}"/>
-              </a:ext>
-            </a:extLst>
-          </p:cNvPr>
-          <p:cNvSpPr txBox="1"/>
+          <p:cNvPr id="7" name="Rectangle 6">
+            <a:extLst>
+              <a:ext uri="{FF2B5EF4-FFF2-40B4-BE49-F238E27FC236}">
+                <a16:creationId xmlns:a16="http://schemas.microsoft.com/office/drawing/2014/main" xmlns="" id="{CF32972D-8DEB-4BB4-9F19-50C6CFCA549B}"/>
+              </a:ext>
+            </a:extLst>
+          </p:cNvPr>
+          <p:cNvSpPr/>
           <p:nvPr/>
         </p:nvSpPr>
         <p:spPr>
           <a:xfrm>
-            <a:off x="3665620" y="99129"/>
-            <a:ext cx="4860758" cy="369332"/>
+            <a:off x="1998074" y="461578"/>
+            <a:ext cx="8195849" cy="369332"/>
           </a:xfrm>
           <a:prstGeom prst="rect">
             <a:avLst/>
           </a:prstGeom>
-          <a:noFill/>
-        </p:spPr>
-        <p:txBody>
-          <a:bodyPr wrap="square" rtlCol="0">
+        </p:spPr>
+        <p:txBody>
+          <a:bodyPr wrap="square">
             <a:spAutoFit/>
           </a:bodyPr>
           <a:lstStyle/>
@@ -4777,7 +5361,7 @@
             <a:pPr algn="ctr"/>
             <a:r>
               <a:rPr lang="en-AU" dirty="0"/>
-              <a:t>Register a Device</a:t>
+              <a:t>https://www.thethingsnetwork.org/docs/devices/lopy/usage.html</a:t>
             </a:r>
           </a:p>
         </p:txBody>
@@ -4785,7 +5369,7 @@
     </p:spTree>
     <p:extLst>
       <p:ext uri="{BB962C8B-B14F-4D97-AF65-F5344CB8AC3E}">
-        <p14:creationId xmlns:p14="http://schemas.microsoft.com/office/powerpoint/2010/main" val="1111344884"/>
+        <p14:creationId xmlns:p14="http://schemas.microsoft.com/office/powerpoint/2010/main" val="1098302047"/>
       </p:ext>
     </p:extLst>
   </p:cSld>
@@ -4814,10 +5398,10 @@
       </p:grpSpPr>
       <p:sp>
         <p:nvSpPr>
-          <p:cNvPr id="2" name="TextBox 1">
-            <a:extLst>
-              <a:ext uri="{FF2B5EF4-FFF2-40B4-BE49-F238E27FC236}">
-                <a16:creationId xmlns:a16="http://schemas.microsoft.com/office/drawing/2014/main" id="{32F71674-C97F-482E-B462-7B8D204792B3}"/>
+          <p:cNvPr id="3" name="TextBox 2">
+            <a:extLst>
+              <a:ext uri="{FF2B5EF4-FFF2-40B4-BE49-F238E27FC236}">
+                <a16:creationId xmlns:a16="http://schemas.microsoft.com/office/drawing/2014/main" xmlns="" id="{95E2F207-1E24-4D37-816E-BAED0591586D}"/>
               </a:ext>
             </a:extLst>
           </p:cNvPr>
@@ -4843,22 +5427,17 @@
             <a:pPr algn="ctr"/>
             <a:r>
               <a:rPr lang="en-AU" dirty="0"/>
-              <a:t>Get the Device </a:t>
-            </a:r>
-            <a:r>
-              <a:rPr lang="en-AU" dirty="0" err="1"/>
-              <a:t>EUI</a:t>
-            </a:r>
-            <a:endParaRPr lang="en-AU" dirty="0"/>
+              <a:t>Complete Device Registration</a:t>
+            </a:r>
           </a:p>
         </p:txBody>
       </p:sp>
       <p:pic>
         <p:nvPicPr>
-          <p:cNvPr id="6" name="Picture 5">
-            <a:extLst>
-              <a:ext uri="{FF2B5EF4-FFF2-40B4-BE49-F238E27FC236}">
-                <a16:creationId xmlns:a16="http://schemas.microsoft.com/office/drawing/2014/main" id="{DBE43A88-7652-45A1-923D-EAAD1054D6C0}"/>
+          <p:cNvPr id="4" name="Picture 3">
+            <a:extLst>
+              <a:ext uri="{FF2B5EF4-FFF2-40B4-BE49-F238E27FC236}">
+                <a16:creationId xmlns:a16="http://schemas.microsoft.com/office/drawing/2014/main" xmlns="" id="{0D9EF9BD-03E6-446D-BC19-7B4A16E5B11D}"/>
               </a:ext>
             </a:extLst>
           </p:cNvPr>
@@ -4875,53 +5454,18 @@
         </p:blipFill>
         <p:spPr>
           <a:xfrm>
-            <a:off x="1471612" y="1231983"/>
-            <a:ext cx="9248775" cy="4562475"/>
+            <a:off x="1725745" y="721548"/>
+            <a:ext cx="8740510" cy="6136452"/>
           </a:xfrm>
           <a:prstGeom prst="rect">
             <a:avLst/>
           </a:prstGeom>
         </p:spPr>
       </p:pic>
-      <p:sp>
-        <p:nvSpPr>
-          <p:cNvPr id="7" name="Rectangle 6">
-            <a:extLst>
-              <a:ext uri="{FF2B5EF4-FFF2-40B4-BE49-F238E27FC236}">
-                <a16:creationId xmlns:a16="http://schemas.microsoft.com/office/drawing/2014/main" id="{CF32972D-8DEB-4BB4-9F19-50C6CFCA549B}"/>
-              </a:ext>
-            </a:extLst>
-          </p:cNvPr>
-          <p:cNvSpPr/>
-          <p:nvPr/>
-        </p:nvSpPr>
-        <p:spPr>
-          <a:xfrm>
-            <a:off x="1998074" y="461578"/>
-            <a:ext cx="8195849" cy="369332"/>
-          </a:xfrm>
-          <a:prstGeom prst="rect">
-            <a:avLst/>
-          </a:prstGeom>
-        </p:spPr>
-        <p:txBody>
-          <a:bodyPr wrap="square">
-            <a:spAutoFit/>
-          </a:bodyPr>
-          <a:lstStyle/>
-          <a:p>
-            <a:pPr algn="ctr"/>
-            <a:r>
-              <a:rPr lang="en-AU" dirty="0"/>
-              <a:t>https://www.thethingsnetwork.org/docs/devices/lopy/usage.html</a:t>
-            </a:r>
-          </a:p>
-        </p:txBody>
-      </p:sp>
     </p:spTree>
     <p:extLst>
       <p:ext uri="{BB962C8B-B14F-4D97-AF65-F5344CB8AC3E}">
-        <p14:creationId xmlns:p14="http://schemas.microsoft.com/office/powerpoint/2010/main" val="1098302047"/>
+        <p14:creationId xmlns:p14="http://schemas.microsoft.com/office/powerpoint/2010/main" val="3313685679"/>
       </p:ext>
     </p:extLst>
   </p:cSld>
@@ -4948,48 +5492,12 @@
           <a:chExt cx="0" cy="0"/>
         </a:xfrm>
       </p:grpSpPr>
-      <p:sp>
-        <p:nvSpPr>
-          <p:cNvPr id="3" name="TextBox 2">
-            <a:extLst>
-              <a:ext uri="{FF2B5EF4-FFF2-40B4-BE49-F238E27FC236}">
-                <a16:creationId xmlns:a16="http://schemas.microsoft.com/office/drawing/2014/main" id="{95E2F207-1E24-4D37-816E-BAED0591586D}"/>
-              </a:ext>
-            </a:extLst>
-          </p:cNvPr>
-          <p:cNvSpPr txBox="1"/>
-          <p:nvPr/>
-        </p:nvSpPr>
-        <p:spPr>
-          <a:xfrm>
-            <a:off x="3665621" y="60506"/>
-            <a:ext cx="4860758" cy="369332"/>
-          </a:xfrm>
-          <a:prstGeom prst="rect">
-            <a:avLst/>
-          </a:prstGeom>
-          <a:noFill/>
-        </p:spPr>
-        <p:txBody>
-          <a:bodyPr wrap="square" rtlCol="0">
-            <a:spAutoFit/>
-          </a:bodyPr>
-          <a:lstStyle/>
-          <a:p>
-            <a:pPr algn="ctr"/>
-            <a:r>
-              <a:rPr lang="en-AU" dirty="0"/>
-              <a:t>Complete Device Registration</a:t>
-            </a:r>
-          </a:p>
-        </p:txBody>
-      </p:sp>
       <p:pic>
         <p:nvPicPr>
-          <p:cNvPr id="4" name="Picture 3">
-            <a:extLst>
-              <a:ext uri="{FF2B5EF4-FFF2-40B4-BE49-F238E27FC236}">
-                <a16:creationId xmlns:a16="http://schemas.microsoft.com/office/drawing/2014/main" id="{0D9EF9BD-03E6-446D-BC19-7B4A16E5B11D}"/>
+          <p:cNvPr id="2" name="Picture 1">
+            <a:extLst>
+              <a:ext uri="{FF2B5EF4-FFF2-40B4-BE49-F238E27FC236}">
+                <a16:creationId xmlns:a16="http://schemas.microsoft.com/office/drawing/2014/main" xmlns="" id="{E31DD967-42AA-411A-8B94-6EFF6B703C79}"/>
               </a:ext>
             </a:extLst>
           </p:cNvPr>
@@ -5006,18 +5514,54 @@
         </p:blipFill>
         <p:spPr>
           <a:xfrm>
-            <a:off x="1725745" y="721548"/>
-            <a:ext cx="8740510" cy="6136452"/>
+            <a:off x="1483311" y="968038"/>
+            <a:ext cx="9225377" cy="5795746"/>
           </a:xfrm>
           <a:prstGeom prst="rect">
             <a:avLst/>
           </a:prstGeom>
         </p:spPr>
       </p:pic>
+      <p:sp>
+        <p:nvSpPr>
+          <p:cNvPr id="3" name="TextBox 2">
+            <a:extLst>
+              <a:ext uri="{FF2B5EF4-FFF2-40B4-BE49-F238E27FC236}">
+                <a16:creationId xmlns:a16="http://schemas.microsoft.com/office/drawing/2014/main" xmlns="" id="{5DB32843-DFBD-41E0-9857-B923468E265D}"/>
+              </a:ext>
+            </a:extLst>
+          </p:cNvPr>
+          <p:cNvSpPr txBox="1"/>
+          <p:nvPr/>
+        </p:nvSpPr>
+        <p:spPr>
+          <a:xfrm>
+            <a:off x="3665621" y="60506"/>
+            <a:ext cx="4860758" cy="369332"/>
+          </a:xfrm>
+          <a:prstGeom prst="rect">
+            <a:avLst/>
+          </a:prstGeom>
+          <a:noFill/>
+        </p:spPr>
+        <p:txBody>
+          <a:bodyPr wrap="square" rtlCol="0">
+            <a:spAutoFit/>
+          </a:bodyPr>
+          <a:lstStyle/>
+          <a:p>
+            <a:pPr algn="ctr"/>
+            <a:r>
+              <a:rPr lang="en-AU" dirty="0"/>
+              <a:t>Get App Settings</a:t>
+            </a:r>
+          </a:p>
+        </p:txBody>
+      </p:sp>
     </p:spTree>
     <p:extLst>
       <p:ext uri="{BB962C8B-B14F-4D97-AF65-F5344CB8AC3E}">
-        <p14:creationId xmlns:p14="http://schemas.microsoft.com/office/powerpoint/2010/main" val="3313685679"/>
+        <p14:creationId xmlns:p14="http://schemas.microsoft.com/office/powerpoint/2010/main" val="133012323"/>
       </p:ext>
     </p:extLst>
   </p:cSld>
@@ -5046,10 +5590,10 @@
       </p:grpSpPr>
       <p:pic>
         <p:nvPicPr>
-          <p:cNvPr id="2" name="Picture 1">
-            <a:extLst>
-              <a:ext uri="{FF2B5EF4-FFF2-40B4-BE49-F238E27FC236}">
-                <a16:creationId xmlns:a16="http://schemas.microsoft.com/office/drawing/2014/main" id="{E31DD967-42AA-411A-8B94-6EFF6B703C79}"/>
+          <p:cNvPr id="3" name="Picture 2">
+            <a:extLst>
+              <a:ext uri="{FF2B5EF4-FFF2-40B4-BE49-F238E27FC236}">
+                <a16:creationId xmlns:a16="http://schemas.microsoft.com/office/drawing/2014/main" xmlns="" id="{962565EA-C1AB-480E-B974-499AA8C572BF}"/>
               </a:ext>
             </a:extLst>
           </p:cNvPr>
@@ -5066,8 +5610,8 @@
         </p:blipFill>
         <p:spPr>
           <a:xfrm>
-            <a:off x="1483311" y="968038"/>
-            <a:ext cx="9225377" cy="5795746"/>
+            <a:off x="2414561" y="762000"/>
+            <a:ext cx="7362878" cy="6096000"/>
           </a:xfrm>
           <a:prstGeom prst="rect">
             <a:avLst/>
@@ -5076,10 +5620,10 @@
       </p:pic>
       <p:sp>
         <p:nvSpPr>
-          <p:cNvPr id="3" name="TextBox 2">
-            <a:extLst>
-              <a:ext uri="{FF2B5EF4-FFF2-40B4-BE49-F238E27FC236}">
-                <a16:creationId xmlns:a16="http://schemas.microsoft.com/office/drawing/2014/main" id="{5DB32843-DFBD-41E0-9857-B923468E265D}"/>
+          <p:cNvPr id="4" name="TextBox 3">
+            <a:extLst>
+              <a:ext uri="{FF2B5EF4-FFF2-40B4-BE49-F238E27FC236}">
+                <a16:creationId xmlns:a16="http://schemas.microsoft.com/office/drawing/2014/main" xmlns="" id="{D16C63C8-1E3F-4DAE-90E5-93A1C62F90D6}"/>
               </a:ext>
             </a:extLst>
           </p:cNvPr>
@@ -5105,7 +5649,7 @@
             <a:pPr algn="ctr"/>
             <a:r>
               <a:rPr lang="en-AU" dirty="0"/>
-              <a:t>Get App Settings</a:t>
+              <a:t>Update config.py</a:t>
             </a:r>
           </a:p>
         </p:txBody>
@@ -5113,7 +5657,7 @@
     </p:spTree>
     <p:extLst>
       <p:ext uri="{BB962C8B-B14F-4D97-AF65-F5344CB8AC3E}">
-        <p14:creationId xmlns:p14="http://schemas.microsoft.com/office/powerpoint/2010/main" val="133012323"/>
+        <p14:creationId xmlns:p14="http://schemas.microsoft.com/office/powerpoint/2010/main" val="2338549298"/>
       </p:ext>
     </p:extLst>
   </p:cSld>

</xml_diff>